<commit_message>
changed 'x' to 'x_scale' and 'y' to 'y_scale'
</commit_message>
<xml_diff>
--- a/Lectures/Byte 3.pptx
+++ b/Lectures/Byte 3.pptx
@@ -244,7 +244,7 @@
           <a:p>
             <a:fld id="{D3AAB66F-B1B7-D045-B4E8-4F60236F228D}" type="datetimeFigureOut">
               <a:rPr lang="en-US" smtClean="0"/>
-              <a:t>2/3/14</a:t>
+              <a:t>2/7/14</a:t>
             </a:fld>
             <a:endParaRPr lang="en-US"/>
           </a:p>
@@ -410,7 +410,7 @@
           <a:p>
             <a:fld id="{BCCF8E76-06A6-164E-A6FA-EC32C13EB232}" type="datetimeFigureOut">
               <a:rPr lang="en-US" smtClean="0"/>
-              <a:t>2/3/14</a:t>
+              <a:t>2/7/14</a:t>
             </a:fld>
             <a:endParaRPr lang="en-US"/>
           </a:p>
@@ -723,6 +723,102 @@
           <a:bodyPr/>
           <a:lstStyle/>
           <a:p>
+            <a:endParaRPr lang="en-US"/>
+          </a:p>
+          <a:p>
+            <a:r>
+              <a:rPr lang="en-US"/>
+              <a:t>----- Meeting Notes (2/6/14 09:50) -----</a:t>
+            </a:r>
+          </a:p>
+          <a:p>
+            <a:r>
+              <a:rPr lang="en-US"/>
+              <a:t>missing body here</a:t>
+            </a:r>
+          </a:p>
+        </p:txBody>
+      </p:sp>
+      <p:sp>
+        <p:nvSpPr>
+          <p:cNvPr id="4" name="Slide Number Placeholder 3"/>
+          <p:cNvSpPr>
+            <a:spLocks noGrp="1"/>
+          </p:cNvSpPr>
+          <p:nvPr>
+            <p:ph type="sldNum" sz="quarter" idx="10"/>
+          </p:nvPr>
+        </p:nvSpPr>
+        <p:spPr/>
+        <p:txBody>
+          <a:bodyPr/>
+          <a:lstStyle/>
+          <a:p>
+            <a:fld id="{FD66F34B-9C4D-8640-BB34-4C24A79C9FFB}" type="slidenum">
+              <a:rPr lang="en-US" smtClean="0"/>
+              <a:t>4</a:t>
+            </a:fld>
+            <a:endParaRPr lang="en-US"/>
+          </a:p>
+        </p:txBody>
+      </p:sp>
+    </p:spTree>
+    <p:extLst>
+      <p:ext uri="{BB962C8B-B14F-4D97-AF65-F5344CB8AC3E}">
+        <p14:creationId xmlns:p14="http://schemas.microsoft.com/office/powerpoint/2010/main" val="3482399022"/>
+      </p:ext>
+    </p:extLst>
+  </p:cSld>
+  <p:clrMapOvr>
+    <a:masterClrMapping/>
+  </p:clrMapOvr>
+</p:notes>
+</file>
+
+<file path=ppt/notesSlides/notesSlide10.xml><?xml version="1.0" encoding="utf-8"?>
+<p:notes xmlns:a="http://schemas.openxmlformats.org/drawingml/2006/main" xmlns:r="http://schemas.openxmlformats.org/officeDocument/2006/relationships" xmlns:p="http://schemas.openxmlformats.org/presentationml/2006/main">
+  <p:cSld>
+    <p:spTree>
+      <p:nvGrpSpPr>
+        <p:cNvPr id="1" name=""/>
+        <p:cNvGrpSpPr/>
+        <p:nvPr/>
+      </p:nvGrpSpPr>
+      <p:grpSpPr>
+        <a:xfrm>
+          <a:off x="0" y="0"/>
+          <a:ext cx="0" cy="0"/>
+          <a:chOff x="0" y="0"/>
+          <a:chExt cx="0" cy="0"/>
+        </a:xfrm>
+      </p:grpSpPr>
+      <p:sp>
+        <p:nvSpPr>
+          <p:cNvPr id="2" name="Slide Image Placeholder 1"/>
+          <p:cNvSpPr>
+            <a:spLocks noGrp="1" noRot="1" noChangeAspect="1"/>
+          </p:cNvSpPr>
+          <p:nvPr>
+            <p:ph type="sldImg"/>
+          </p:nvPr>
+        </p:nvSpPr>
+        <p:spPr/>
+      </p:sp>
+      <p:sp>
+        <p:nvSpPr>
+          <p:cNvPr id="3" name="Notes Placeholder 2"/>
+          <p:cNvSpPr>
+            <a:spLocks noGrp="1"/>
+          </p:cNvSpPr>
+          <p:nvPr>
+            <p:ph type="body" idx="1"/>
+          </p:nvPr>
+        </p:nvSpPr>
+        <p:spPr/>
+        <p:txBody>
+          <a:bodyPr/>
+          <a:lstStyle/>
+          <a:p>
             <a:pPr marL="0" marR="0" indent="0" algn="l" defTabSz="457200" rtl="0" eaLnBrk="1" fontAlgn="auto" latinLnBrk="0" hangingPunct="1">
               <a:lnSpc>
                 <a:spcPct val="100000"/>
@@ -761,7 +857,209 @@
           <a:p>
             <a:fld id="{FD66F34B-9C4D-8640-BB34-4C24A79C9FFB}" type="slidenum">
               <a:rPr lang="en-US" smtClean="0"/>
-              <a:t>29</a:t>
+              <a:t>35</a:t>
+            </a:fld>
+            <a:endParaRPr lang="en-US"/>
+          </a:p>
+        </p:txBody>
+      </p:sp>
+    </p:spTree>
+    <p:extLst>
+      <p:ext uri="{BB962C8B-B14F-4D97-AF65-F5344CB8AC3E}">
+        <p14:creationId xmlns:p14="http://schemas.microsoft.com/office/powerpoint/2010/main" val="859244327"/>
+      </p:ext>
+    </p:extLst>
+  </p:cSld>
+  <p:clrMapOvr>
+    <a:masterClrMapping/>
+  </p:clrMapOvr>
+</p:notes>
+</file>
+
+<file path=ppt/notesSlides/notesSlide11.xml><?xml version="1.0" encoding="utf-8"?>
+<p:notes xmlns:a="http://schemas.openxmlformats.org/drawingml/2006/main" xmlns:r="http://schemas.openxmlformats.org/officeDocument/2006/relationships" xmlns:p="http://schemas.openxmlformats.org/presentationml/2006/main">
+  <p:cSld>
+    <p:spTree>
+      <p:nvGrpSpPr>
+        <p:cNvPr id="1" name=""/>
+        <p:cNvGrpSpPr/>
+        <p:nvPr/>
+      </p:nvGrpSpPr>
+      <p:grpSpPr>
+        <a:xfrm>
+          <a:off x="0" y="0"/>
+          <a:ext cx="0" cy="0"/>
+          <a:chOff x="0" y="0"/>
+          <a:chExt cx="0" cy="0"/>
+        </a:xfrm>
+      </p:grpSpPr>
+      <p:sp>
+        <p:nvSpPr>
+          <p:cNvPr id="2" name="Slide Image Placeholder 1"/>
+          <p:cNvSpPr>
+            <a:spLocks noGrp="1" noRot="1" noChangeAspect="1"/>
+          </p:cNvSpPr>
+          <p:nvPr>
+            <p:ph type="sldImg"/>
+          </p:nvPr>
+        </p:nvSpPr>
+        <p:spPr/>
+      </p:sp>
+      <p:sp>
+        <p:nvSpPr>
+          <p:cNvPr id="3" name="Notes Placeholder 2"/>
+          <p:cNvSpPr>
+            <a:spLocks noGrp="1"/>
+          </p:cNvSpPr>
+          <p:nvPr>
+            <p:ph type="body" idx="1"/>
+          </p:nvPr>
+        </p:nvSpPr>
+        <p:spPr/>
+        <p:txBody>
+          <a:bodyPr/>
+          <a:lstStyle/>
+          <a:p>
+            <a:pPr marL="0" marR="0" indent="0" algn="l" defTabSz="457200" rtl="0" eaLnBrk="1" fontAlgn="auto" latinLnBrk="0" hangingPunct="1">
+              <a:lnSpc>
+                <a:spcPct val="100000"/>
+              </a:lnSpc>
+              <a:spcBef>
+                <a:spcPts val="0"/>
+              </a:spcBef>
+              <a:spcAft>
+                <a:spcPts val="0"/>
+              </a:spcAft>
+              <a:buClrTx/>
+              <a:buSzTx/>
+              <a:buFontTx/>
+              <a:buNone/>
+              <a:tabLst/>
+              <a:defRPr/>
+            </a:pPr>
+            <a:endParaRPr lang="en-US" dirty="0"/>
+          </a:p>
+        </p:txBody>
+      </p:sp>
+      <p:sp>
+        <p:nvSpPr>
+          <p:cNvPr id="4" name="Slide Number Placeholder 3"/>
+          <p:cNvSpPr>
+            <a:spLocks noGrp="1"/>
+          </p:cNvSpPr>
+          <p:nvPr>
+            <p:ph type="sldNum" sz="quarter" idx="10"/>
+          </p:nvPr>
+        </p:nvSpPr>
+        <p:spPr/>
+        <p:txBody>
+          <a:bodyPr/>
+          <a:lstStyle/>
+          <a:p>
+            <a:fld id="{FD66F34B-9C4D-8640-BB34-4C24A79C9FFB}" type="slidenum">
+              <a:rPr lang="en-US" smtClean="0"/>
+              <a:t>36</a:t>
+            </a:fld>
+            <a:endParaRPr lang="en-US"/>
+          </a:p>
+        </p:txBody>
+      </p:sp>
+    </p:spTree>
+    <p:extLst>
+      <p:ext uri="{BB962C8B-B14F-4D97-AF65-F5344CB8AC3E}">
+        <p14:creationId xmlns:p14="http://schemas.microsoft.com/office/powerpoint/2010/main" val="859244327"/>
+      </p:ext>
+    </p:extLst>
+  </p:cSld>
+  <p:clrMapOvr>
+    <a:masterClrMapping/>
+  </p:clrMapOvr>
+</p:notes>
+</file>
+
+<file path=ppt/notesSlides/notesSlide12.xml><?xml version="1.0" encoding="utf-8"?>
+<p:notes xmlns:a="http://schemas.openxmlformats.org/drawingml/2006/main" xmlns:r="http://schemas.openxmlformats.org/officeDocument/2006/relationships" xmlns:p="http://schemas.openxmlformats.org/presentationml/2006/main">
+  <p:cSld>
+    <p:spTree>
+      <p:nvGrpSpPr>
+        <p:cNvPr id="1" name=""/>
+        <p:cNvGrpSpPr/>
+        <p:nvPr/>
+      </p:nvGrpSpPr>
+      <p:grpSpPr>
+        <a:xfrm>
+          <a:off x="0" y="0"/>
+          <a:ext cx="0" cy="0"/>
+          <a:chOff x="0" y="0"/>
+          <a:chExt cx="0" cy="0"/>
+        </a:xfrm>
+      </p:grpSpPr>
+      <p:sp>
+        <p:nvSpPr>
+          <p:cNvPr id="2" name="Slide Image Placeholder 1"/>
+          <p:cNvSpPr>
+            <a:spLocks noGrp="1" noRot="1" noChangeAspect="1"/>
+          </p:cNvSpPr>
+          <p:nvPr>
+            <p:ph type="sldImg"/>
+          </p:nvPr>
+        </p:nvSpPr>
+        <p:spPr/>
+      </p:sp>
+      <p:sp>
+        <p:nvSpPr>
+          <p:cNvPr id="3" name="Notes Placeholder 2"/>
+          <p:cNvSpPr>
+            <a:spLocks noGrp="1"/>
+          </p:cNvSpPr>
+          <p:nvPr>
+            <p:ph type="body" idx="1"/>
+          </p:nvPr>
+        </p:nvSpPr>
+        <p:spPr/>
+        <p:txBody>
+          <a:bodyPr/>
+          <a:lstStyle/>
+          <a:p>
+            <a:pPr marL="0" marR="0" indent="0" algn="l" defTabSz="457200" rtl="0" eaLnBrk="1" fontAlgn="auto" latinLnBrk="0" hangingPunct="1">
+              <a:lnSpc>
+                <a:spcPct val="100000"/>
+              </a:lnSpc>
+              <a:spcBef>
+                <a:spcPts val="0"/>
+              </a:spcBef>
+              <a:spcAft>
+                <a:spcPts val="0"/>
+              </a:spcAft>
+              <a:buClrTx/>
+              <a:buSzTx/>
+              <a:buFontTx/>
+              <a:buNone/>
+              <a:tabLst/>
+              <a:defRPr/>
+            </a:pPr>
+            <a:endParaRPr lang="en-US" dirty="0"/>
+          </a:p>
+        </p:txBody>
+      </p:sp>
+      <p:sp>
+        <p:nvSpPr>
+          <p:cNvPr id="4" name="Slide Number Placeholder 3"/>
+          <p:cNvSpPr>
+            <a:spLocks noGrp="1"/>
+          </p:cNvSpPr>
+          <p:nvPr>
+            <p:ph type="sldNum" sz="quarter" idx="10"/>
+          </p:nvPr>
+        </p:nvSpPr>
+        <p:spPr/>
+        <p:txBody>
+          <a:bodyPr/>
+          <a:lstStyle/>
+          <a:p>
+            <a:fld id="{FD66F34B-9C4D-8640-BB34-4C24A79C9FFB}" type="slidenum">
+              <a:rPr lang="en-US" smtClean="0"/>
+              <a:t>37</a:t>
             </a:fld>
             <a:endParaRPr lang="en-US"/>
           </a:p>
@@ -824,24 +1122,19 @@
           <a:bodyPr/>
           <a:lstStyle/>
           <a:p>
-            <a:pPr marL="0" marR="0" indent="0" algn="l" defTabSz="457200" rtl="0" eaLnBrk="1" fontAlgn="auto" latinLnBrk="0" hangingPunct="1">
-              <a:lnSpc>
-                <a:spcPct val="100000"/>
-              </a:lnSpc>
-              <a:spcBef>
-                <a:spcPts val="0"/>
-              </a:spcBef>
-              <a:spcAft>
-                <a:spcPts val="0"/>
-              </a:spcAft>
-              <a:buClrTx/>
-              <a:buSzTx/>
-              <a:buFontTx/>
-              <a:buNone/>
-              <a:tabLst/>
-              <a:defRPr/>
-            </a:pPr>
-            <a:endParaRPr lang="en-US" dirty="0"/>
+            <a:endParaRPr lang="en-US"/>
+          </a:p>
+          <a:p>
+            <a:r>
+              <a:rPr lang="en-US"/>
+              <a:t>----- Meeting Notes (2/6/14 09:50) -----</a:t>
+            </a:r>
+          </a:p>
+          <a:p>
+            <a:r>
+              <a:rPr lang="en-US"/>
+              <a:t>change x to x_scale</a:t>
+            </a:r>
           </a:p>
         </p:txBody>
       </p:sp>
@@ -862,7 +1155,7 @@
           <a:p>
             <a:fld id="{FD66F34B-9C4D-8640-BB34-4C24A79C9FFB}" type="slidenum">
               <a:rPr lang="en-US" smtClean="0"/>
-              <a:t>30</a:t>
+              <a:t>12</a:t>
             </a:fld>
             <a:endParaRPr lang="en-US"/>
           </a:p>
@@ -871,7 +1164,7 @@
     </p:spTree>
     <p:extLst>
       <p:ext uri="{BB962C8B-B14F-4D97-AF65-F5344CB8AC3E}">
-        <p14:creationId xmlns:p14="http://schemas.microsoft.com/office/powerpoint/2010/main" val="859244327"/>
+        <p14:creationId xmlns:p14="http://schemas.microsoft.com/office/powerpoint/2010/main" val="2655607328"/>
       </p:ext>
     </p:extLst>
   </p:cSld>
@@ -925,24 +1218,19 @@
           <a:bodyPr/>
           <a:lstStyle/>
           <a:p>
-            <a:pPr marL="0" marR="0" indent="0" algn="l" defTabSz="457200" rtl="0" eaLnBrk="1" fontAlgn="auto" latinLnBrk="0" hangingPunct="1">
-              <a:lnSpc>
-                <a:spcPct val="100000"/>
-              </a:lnSpc>
-              <a:spcBef>
-                <a:spcPts val="0"/>
-              </a:spcBef>
-              <a:spcAft>
-                <a:spcPts val="0"/>
-              </a:spcAft>
-              <a:buClrTx/>
-              <a:buSzTx/>
-              <a:buFontTx/>
-              <a:buNone/>
-              <a:tabLst/>
-              <a:defRPr/>
-            </a:pPr>
-            <a:endParaRPr lang="en-US" dirty="0"/>
+            <a:endParaRPr lang="en-US"/>
+          </a:p>
+          <a:p>
+            <a:r>
+              <a:rPr lang="en-US"/>
+              <a:t>----- Meeting Notes (2/6/14 09:50) -----</a:t>
+            </a:r>
+          </a:p>
+          <a:p>
+            <a:r>
+              <a:rPr lang="en-US"/>
+              <a:t>change d.x to d.y in the second case </a:t>
+            </a:r>
           </a:p>
         </p:txBody>
       </p:sp>
@@ -963,7 +1251,7 @@
           <a:p>
             <a:fld id="{FD66F34B-9C4D-8640-BB34-4C24A79C9FFB}" type="slidenum">
               <a:rPr lang="en-US" smtClean="0"/>
-              <a:t>31</a:t>
+              <a:t>27</a:t>
             </a:fld>
             <a:endParaRPr lang="en-US"/>
           </a:p>
@@ -972,7 +1260,7 @@
     </p:spTree>
     <p:extLst>
       <p:ext uri="{BB962C8B-B14F-4D97-AF65-F5344CB8AC3E}">
-        <p14:creationId xmlns:p14="http://schemas.microsoft.com/office/powerpoint/2010/main" val="859244327"/>
+        <p14:creationId xmlns:p14="http://schemas.microsoft.com/office/powerpoint/2010/main" val="2661094606"/>
       </p:ext>
     </p:extLst>
   </p:cSld>
@@ -1064,7 +1352,7 @@
           <a:p>
             <a:fld id="{FD66F34B-9C4D-8640-BB34-4C24A79C9FFB}" type="slidenum">
               <a:rPr lang="en-US" smtClean="0"/>
-              <a:t>32</a:t>
+              <a:t>29</a:t>
             </a:fld>
             <a:endParaRPr lang="en-US"/>
           </a:p>
@@ -1165,7 +1453,7 @@
           <a:p>
             <a:fld id="{FD66F34B-9C4D-8640-BB34-4C24A79C9FFB}" type="slidenum">
               <a:rPr lang="en-US" smtClean="0"/>
-              <a:t>33</a:t>
+              <a:t>30</a:t>
             </a:fld>
             <a:endParaRPr lang="en-US"/>
           </a:p>
@@ -1245,73 +1533,7 @@
               <a:tabLst/>
               <a:defRPr/>
             </a:pPr>
-            <a:r>
-              <a:rPr lang="en-US" dirty="0" smtClean="0"/>
-              <a:t> // we add a new array (</a:t>
-            </a:r>
-            <a:r>
-              <a:rPr lang="en-US" dirty="0" err="1" smtClean="0"/>
-              <a:t>d.outcomes</a:t>
-            </a:r>
-            <a:r>
-              <a:rPr lang="en-US" dirty="0" smtClean="0"/>
-              <a:t>) with information about every sub-bar's </a:t>
-            </a:r>
-          </a:p>
-          <a:p>
-            <a:pPr marL="0" indent="0">
-              <a:buNone/>
-            </a:pPr>
-            <a:r>
-              <a:rPr lang="en-US" sz="1200" dirty="0" smtClean="0"/>
-              <a:t>// y0 and y1 position for that age; and a new value (</a:t>
-            </a:r>
-            <a:r>
-              <a:rPr lang="en-US" sz="1200" dirty="0" err="1" smtClean="0"/>
-              <a:t>d.total</a:t>
-            </a:r>
-            <a:r>
-              <a:rPr lang="en-US" sz="1200" dirty="0" smtClean="0"/>
-              <a:t>) with </a:t>
-            </a:r>
-          </a:p>
-          <a:p>
-            <a:pPr marL="0" indent="0">
-              <a:buNone/>
-            </a:pPr>
-            <a:r>
-              <a:rPr lang="en-US" sz="1200" dirty="0" smtClean="0"/>
-              <a:t>       // information about the total height of the stacked bar</a:t>
-            </a:r>
-          </a:p>
-          <a:p>
-            <a:pPr marL="0" indent="0">
-              <a:buNone/>
-            </a:pPr>
-            <a:endParaRPr lang="en-US" sz="1200" dirty="0" smtClean="0"/>
-          </a:p>
-          <a:p>
-            <a:pPr marL="0" indent="0">
-              <a:buNone/>
-            </a:pPr>
-            <a:r>
-              <a:rPr lang="en-US" sz="1200" dirty="0" smtClean="0"/>
-              <a:t> // y labels. This runs function(name) once for each y label (name is the current label)</a:t>
-            </a:r>
-          </a:p>
-          <a:p>
-            <a:pPr marL="0" indent="0">
-              <a:buNone/>
-            </a:pPr>
-            <a:r>
-              <a:rPr lang="en-US" sz="1200" dirty="0" smtClean="0"/>
-              <a:t>         // and stores each resulting dictionary in the array </a:t>
-            </a:r>
-            <a:r>
-              <a:rPr lang="en-US" sz="1200" smtClean="0"/>
-              <a:t>d.outcomes</a:t>
-            </a:r>
-            <a:endParaRPr lang="en-US"/>
+            <a:endParaRPr lang="en-US" dirty="0"/>
           </a:p>
         </p:txBody>
       </p:sp>
@@ -1332,7 +1554,7 @@
           <a:p>
             <a:fld id="{FD66F34B-9C4D-8640-BB34-4C24A79C9FFB}" type="slidenum">
               <a:rPr lang="en-US" smtClean="0"/>
-              <a:t>34</a:t>
+              <a:t>31</a:t>
             </a:fld>
             <a:endParaRPr lang="en-US"/>
           </a:p>
@@ -1433,7 +1655,7 @@
           <a:p>
             <a:fld id="{FD66F34B-9C4D-8640-BB34-4C24A79C9FFB}" type="slidenum">
               <a:rPr lang="en-US" smtClean="0"/>
-              <a:t>35</a:t>
+              <a:t>32</a:t>
             </a:fld>
             <a:endParaRPr lang="en-US"/>
           </a:p>
@@ -1534,7 +1756,7 @@
           <a:p>
             <a:fld id="{FD66F34B-9C4D-8640-BB34-4C24A79C9FFB}" type="slidenum">
               <a:rPr lang="en-US" smtClean="0"/>
-              <a:t>36</a:t>
+              <a:t>33</a:t>
             </a:fld>
             <a:endParaRPr lang="en-US"/>
           </a:p>
@@ -1614,7 +1836,73 @@
               <a:tabLst/>
               <a:defRPr/>
             </a:pPr>
-            <a:endParaRPr lang="en-US" dirty="0"/>
+            <a:r>
+              <a:rPr lang="en-US" dirty="0" smtClean="0"/>
+              <a:t> // we add a new array (</a:t>
+            </a:r>
+            <a:r>
+              <a:rPr lang="en-US" dirty="0" err="1" smtClean="0"/>
+              <a:t>d.outcomes</a:t>
+            </a:r>
+            <a:r>
+              <a:rPr lang="en-US" dirty="0" smtClean="0"/>
+              <a:t>) with information about every sub-bar's </a:t>
+            </a:r>
+          </a:p>
+          <a:p>
+            <a:pPr marL="0" indent="0">
+              <a:buNone/>
+            </a:pPr>
+            <a:r>
+              <a:rPr lang="en-US" sz="1200" dirty="0" smtClean="0"/>
+              <a:t>// y0 and y1 position for that age; and a new value (</a:t>
+            </a:r>
+            <a:r>
+              <a:rPr lang="en-US" sz="1200" dirty="0" err="1" smtClean="0"/>
+              <a:t>d.total</a:t>
+            </a:r>
+            <a:r>
+              <a:rPr lang="en-US" sz="1200" dirty="0" smtClean="0"/>
+              <a:t>) with </a:t>
+            </a:r>
+          </a:p>
+          <a:p>
+            <a:pPr marL="0" indent="0">
+              <a:buNone/>
+            </a:pPr>
+            <a:r>
+              <a:rPr lang="en-US" sz="1200" dirty="0" smtClean="0"/>
+              <a:t>       // information about the total height of the stacked bar</a:t>
+            </a:r>
+          </a:p>
+          <a:p>
+            <a:pPr marL="0" indent="0">
+              <a:buNone/>
+            </a:pPr>
+            <a:endParaRPr lang="en-US" sz="1200" dirty="0" smtClean="0"/>
+          </a:p>
+          <a:p>
+            <a:pPr marL="0" indent="0">
+              <a:buNone/>
+            </a:pPr>
+            <a:r>
+              <a:rPr lang="en-US" sz="1200" dirty="0" smtClean="0"/>
+              <a:t> // y labels. This runs function(name) once for each y label (name is the current label)</a:t>
+            </a:r>
+          </a:p>
+          <a:p>
+            <a:pPr marL="0" indent="0">
+              <a:buNone/>
+            </a:pPr>
+            <a:r>
+              <a:rPr lang="en-US" sz="1200" dirty="0" smtClean="0"/>
+              <a:t>         // and stores each resulting dictionary in the array </a:t>
+            </a:r>
+            <a:r>
+              <a:rPr lang="en-US" sz="1200" smtClean="0"/>
+              <a:t>d.outcomes</a:t>
+            </a:r>
+            <a:endParaRPr lang="en-US"/>
           </a:p>
         </p:txBody>
       </p:sp>
@@ -1635,7 +1923,7 @@
           <a:p>
             <a:fld id="{FD66F34B-9C4D-8640-BB34-4C24A79C9FFB}" type="slidenum">
               <a:rPr lang="en-US" smtClean="0"/>
-              <a:t>37</a:t>
+              <a:t>34</a:t>
             </a:fld>
             <a:endParaRPr lang="en-US"/>
           </a:p>
@@ -2171,7 +2459,7 @@
             <a:fld id="{FA3C144B-2939-9A49-B014-915EC3E81866}" type="datetime1">
               <a:rPr lang="en-US" smtClean="0"/>
               <a:pPr/>
-              <a:t>2/3/14</a:t>
+              <a:t>2/7/14</a:t>
             </a:fld>
             <a:endParaRPr lang="en-US" dirty="0"/>
           </a:p>
@@ -2600,7 +2888,7 @@
           <a:p>
             <a:fld id="{76838339-A875-5E45-AB3F-AAABD270346A}" type="datetime1">
               <a:rPr lang="en-US" smtClean="0"/>
-              <a:t>2/3/14</a:t>
+              <a:t>2/7/14</a:t>
             </a:fld>
             <a:endParaRPr lang="en-US"/>
           </a:p>
@@ -2886,7 +3174,7 @@
             <a:fld id="{FA3C144B-2939-9A49-B014-915EC3E81866}" type="datetime1">
               <a:rPr lang="en-US" smtClean="0"/>
               <a:pPr/>
-              <a:t>2/3/14</a:t>
+              <a:t>2/7/14</a:t>
             </a:fld>
             <a:endParaRPr lang="en-US" dirty="0"/>
           </a:p>
@@ -3368,7 +3656,7 @@
           <a:p>
             <a:fld id="{A73F672F-A5FB-5745-934A-1BF51CA5539C}" type="datetime1">
               <a:rPr lang="en-US" smtClean="0"/>
-              <a:t>2/3/14</a:t>
+              <a:t>2/7/14</a:t>
             </a:fld>
             <a:endParaRPr lang="en-US"/>
           </a:p>
@@ -3710,7 +3998,7 @@
             <a:fld id="{FA3C144B-2939-9A49-B014-915EC3E81866}" type="datetime1">
               <a:rPr lang="en-US" smtClean="0"/>
               <a:pPr/>
-              <a:t>2/3/14</a:t>
+              <a:t>2/7/14</a:t>
             </a:fld>
             <a:endParaRPr lang="en-US" dirty="0"/>
           </a:p>
@@ -4174,7 +4462,7 @@
           <a:p>
             <a:fld id="{6AFE6A63-5EBE-3E48-B0AE-DF655A1ECE76}" type="datetime1">
               <a:rPr lang="en-US" smtClean="0"/>
-              <a:t>2/3/14</a:t>
+              <a:t>2/7/14</a:t>
             </a:fld>
             <a:endParaRPr lang="en-US"/>
           </a:p>
@@ -4493,7 +4781,7 @@
           <a:p>
             <a:fld id="{4A019F0C-9D18-B54A-9AC9-18AA74EDB034}" type="datetime1">
               <a:rPr lang="en-US" smtClean="0"/>
-              <a:t>2/3/14</a:t>
+              <a:t>2/7/14</a:t>
             </a:fld>
             <a:endParaRPr lang="en-US"/>
           </a:p>
@@ -4803,7 +5091,7 @@
             <a:fld id="{FA3C144B-2939-9A49-B014-915EC3E81866}" type="datetime1">
               <a:rPr lang="en-US" smtClean="0"/>
               <a:pPr/>
-              <a:t>2/3/14</a:t>
+              <a:t>2/7/14</a:t>
             </a:fld>
             <a:endParaRPr lang="en-US" dirty="0"/>
           </a:p>
@@ -5066,7 +5354,7 @@
           <a:p>
             <a:fld id="{FA3C144B-2939-9A49-B014-915EC3E81866}" type="datetime1">
               <a:rPr lang="en-US" smtClean="0"/>
-              <a:t>2/3/14</a:t>
+              <a:t>2/7/14</a:t>
             </a:fld>
             <a:endParaRPr lang="en-US" dirty="0"/>
           </a:p>
@@ -5434,7 +5722,7 @@
           <a:p>
             <a:fld id="{7053BEFA-1175-F644-B249-7D41D72BD3FF}" type="datetime1">
               <a:rPr lang="en-US" smtClean="0"/>
-              <a:t>2/3/14</a:t>
+              <a:t>2/7/14</a:t>
             </a:fld>
             <a:endParaRPr lang="en-US"/>
           </a:p>
@@ -5553,7 +5841,7 @@
             <a:fld id="{FA3C144B-2939-9A49-B014-915EC3E81866}" type="datetime1">
               <a:rPr lang="en-US" smtClean="0"/>
               <a:pPr/>
-              <a:t>2/3/14</a:t>
+              <a:t>2/7/14</a:t>
             </a:fld>
             <a:endParaRPr lang="en-US" dirty="0"/>
           </a:p>
@@ -5770,7 +6058,7 @@
             <a:fld id="{FA3C144B-2939-9A49-B014-915EC3E81866}" type="datetime1">
               <a:rPr lang="en-US" smtClean="0"/>
               <a:pPr/>
-              <a:t>2/3/14</a:t>
+              <a:t>2/7/14</a:t>
             </a:fld>
             <a:endParaRPr lang="en-US" dirty="0"/>
           </a:p>
@@ -6015,7 +6303,7 @@
             <a:fld id="{FA3C144B-2939-9A49-B014-915EC3E81866}" type="datetime1">
               <a:rPr lang="en-US" smtClean="0"/>
               <a:pPr/>
-              <a:t>2/3/14</a:t>
+              <a:t>2/7/14</a:t>
             </a:fld>
             <a:endParaRPr lang="en-US" dirty="0"/>
           </a:p>
@@ -6393,7 +6681,7 @@
           <a:p>
             <a:fld id="{111EEF3B-ABF2-AA4E-9E24-0C6256942674}" type="datetime1">
               <a:rPr lang="en-US" smtClean="0"/>
-              <a:t>2/3/14</a:t>
+              <a:t>2/7/14</a:t>
             </a:fld>
             <a:endParaRPr lang="en-US"/>
           </a:p>
@@ -6557,7 +6845,7 @@
             <a:fld id="{FA3C144B-2939-9A49-B014-915EC3E81866}" type="datetime1">
               <a:rPr lang="en-US" smtClean="0"/>
               <a:pPr/>
-              <a:t>2/3/14</a:t>
+              <a:t>2/7/14</a:t>
             </a:fld>
             <a:endParaRPr lang="en-US" dirty="0"/>
           </a:p>
@@ -6974,7 +7262,7 @@
             <a:fld id="{FA3C144B-2939-9A49-B014-915EC3E81866}" type="datetime1">
               <a:rPr lang="en-US" smtClean="0"/>
               <a:pPr/>
-              <a:t>2/3/14</a:t>
+              <a:t>2/7/14</a:t>
             </a:fld>
             <a:endParaRPr lang="en-US" dirty="0"/>
           </a:p>
@@ -7290,7 +7578,7 @@
             <a:fld id="{FA3C144B-2939-9A49-B014-915EC3E81866}" type="datetime1">
               <a:rPr lang="en-US" smtClean="0"/>
               <a:pPr/>
-              <a:t>2/3/14</a:t>
+              <a:t>2/7/14</a:t>
             </a:fld>
             <a:endParaRPr lang="en-US" dirty="0"/>
           </a:p>
@@ -7956,7 +8244,7 @@
             <a:fld id="{FA3C144B-2939-9A49-B014-915EC3E81866}" type="datetime1">
               <a:rPr lang="en-US" smtClean="0"/>
               <a:pPr/>
-              <a:t>2/3/14</a:t>
+              <a:t>2/7/14</a:t>
             </a:fld>
             <a:endParaRPr lang="en-US" dirty="0"/>
           </a:p>
@@ -9121,7 +9409,7 @@
           <a:p>
             <a:fld id="{7053BEFA-1175-F644-B249-7D41D72BD3FF}" type="datetime1">
               <a:rPr lang="en-US" smtClean="0"/>
-              <a:t>2/3/14</a:t>
+              <a:t>2/7/14</a:t>
             </a:fld>
             <a:endParaRPr lang="en-US"/>
           </a:p>
@@ -9304,7 +9592,7 @@
           <a:p>
             <a:fld id="{7053BEFA-1175-F644-B249-7D41D72BD3FF}" type="datetime1">
               <a:rPr lang="en-US" smtClean="0"/>
-              <a:t>2/3/14</a:t>
+              <a:t>2/7/14</a:t>
             </a:fld>
             <a:endParaRPr lang="en-US"/>
           </a:p>
@@ -9613,8 +9901,16 @@
               <a:t> </a:t>
             </a:r>
             <a:r>
-              <a:rPr lang="en-US" sz="2400" dirty="0"/>
-              <a:t>x = d3.scale.ordinal()</a:t>
+              <a:rPr lang="en-US" sz="2400" dirty="0" err="1" smtClean="0"/>
+              <a:t>x_scale</a:t>
+            </a:r>
+            <a:r>
+              <a:rPr lang="en-US" sz="2400" dirty="0" smtClean="0"/>
+              <a:t> </a:t>
+            </a:r>
+            <a:r>
+              <a:rPr lang="en-US" sz="2400" dirty="0"/>
+              <a:t>= d3.scale.ordinal()</a:t>
             </a:r>
           </a:p>
           <a:p>
@@ -9664,7 +9960,7 @@
           <a:p>
             <a:fld id="{7053BEFA-1175-F644-B249-7D41D72BD3FF}" type="datetime1">
               <a:rPr lang="en-US" smtClean="0"/>
-              <a:t>2/3/14</a:t>
+              <a:t>2/7/14</a:t>
             </a:fld>
             <a:endParaRPr lang="en-US"/>
           </a:p>
@@ -9870,8 +10166,16 @@
               <a:t> </a:t>
             </a:r>
             <a:r>
-              <a:rPr lang="en-US" sz="2400" dirty="0"/>
-              <a:t>x = d3.scale.ordinal()</a:t>
+              <a:rPr lang="en-US" sz="2400" dirty="0" err="1" smtClean="0"/>
+              <a:t>x_scale</a:t>
+            </a:r>
+            <a:r>
+              <a:rPr lang="en-US" sz="2400" dirty="0" smtClean="0"/>
+              <a:t> </a:t>
+            </a:r>
+            <a:r>
+              <a:rPr lang="en-US" sz="2400" dirty="0"/>
+              <a:t>= d3.scale.ordinal()</a:t>
             </a:r>
           </a:p>
           <a:p>
@@ -9932,7 +10236,7 @@
           <a:p>
             <a:fld id="{7053BEFA-1175-F644-B249-7D41D72BD3FF}" type="datetime1">
               <a:rPr lang="en-US" smtClean="0"/>
-              <a:t>2/3/14</a:t>
+              <a:t>2/7/14</a:t>
             </a:fld>
             <a:endParaRPr lang="en-US"/>
           </a:p>
@@ -10267,8 +10571,16 @@
               <a:t> </a:t>
             </a:r>
             <a:r>
-              <a:rPr lang="en-US" sz="2400" dirty="0"/>
-              <a:t>x = d3.scale.ordinal()</a:t>
+              <a:rPr lang="en-US" sz="2400" dirty="0" err="1" smtClean="0"/>
+              <a:t>x_scale</a:t>
+            </a:r>
+            <a:r>
+              <a:rPr lang="en-US" sz="2400" dirty="0" smtClean="0"/>
+              <a:t> </a:t>
+            </a:r>
+            <a:r>
+              <a:rPr lang="en-US" sz="2400" dirty="0"/>
+              <a:t>= d3.scale.ordinal()</a:t>
             </a:r>
           </a:p>
           <a:p>
@@ -10317,7 +10629,11 @@
             </a:pPr>
             <a:r>
               <a:rPr lang="en-US" sz="2400" dirty="0" err="1" smtClean="0"/>
-              <a:t>x.domain</a:t>
+              <a:t>x_scale</a:t>
+            </a:r>
+            <a:r>
+              <a:rPr lang="en-US" sz="2400" dirty="0" err="1" smtClean="0"/>
+              <a:t>.domain</a:t>
             </a:r>
             <a:r>
               <a:rPr lang="en-US" sz="2400" dirty="0"/>
@@ -10351,7 +10667,7 @@
           <a:p>
             <a:fld id="{7053BEFA-1175-F644-B249-7D41D72BD3FF}" type="datetime1">
               <a:rPr lang="en-US" smtClean="0"/>
-              <a:t>2/3/14</a:t>
+              <a:t>2/7/14</a:t>
             </a:fld>
             <a:endParaRPr lang="en-US"/>
           </a:p>
@@ -10407,8 +10723,8 @@
         </p:nvSpPr>
         <p:spPr>
           <a:xfrm>
-            <a:off x="904171" y="4577693"/>
-            <a:ext cx="3143086" cy="538093"/>
+            <a:off x="904170" y="4577693"/>
+            <a:ext cx="3851681" cy="538093"/>
           </a:xfrm>
           <a:prstGeom prst="rect">
             <a:avLst/>
@@ -10454,8 +10770,8 @@
             <a:avLst>
               <a:gd name="adj1" fmla="val 34225"/>
               <a:gd name="adj2" fmla="val -7051"/>
-              <a:gd name="adj3" fmla="val -14311"/>
-              <a:gd name="adj4" fmla="val -33528"/>
+              <a:gd name="adj3" fmla="val -13247"/>
+              <a:gd name="adj4" fmla="val -15392"/>
             </a:avLst>
           </a:prstGeom>
           <a:ln/>
@@ -10619,8 +10935,17 @@
             </a:r>
             <a:r>
               <a:rPr lang="en-US" sz="2400" dirty="0"/>
-              <a:t>scale(x)</a:t>
-            </a:r>
+              <a:t>scale(</a:t>
+            </a:r>
+            <a:r>
+              <a:rPr lang="en-US" sz="2400" dirty="0" err="1" smtClean="0"/>
+              <a:t>x_scale</a:t>
+            </a:r>
+            <a:r>
+              <a:rPr lang="en-US" sz="2400" dirty="0" smtClean="0"/>
+              <a:t>)</a:t>
+            </a:r>
+            <a:endParaRPr lang="en-US" sz="2400" dirty="0"/>
           </a:p>
           <a:p>
             <a:pPr marL="0" indent="0">
@@ -10654,7 +10979,7 @@
           <a:p>
             <a:fld id="{7053BEFA-1175-F644-B249-7D41D72BD3FF}" type="datetime1">
               <a:rPr lang="en-US" smtClean="0"/>
-              <a:t>2/3/14</a:t>
+              <a:t>2/7/14</a:t>
             </a:fld>
             <a:endParaRPr lang="en-US"/>
           </a:p>
@@ -10820,8 +11145,17 @@
             </a:r>
             <a:r>
               <a:rPr lang="en-US" sz="2400" dirty="0"/>
-              <a:t>scale(x)</a:t>
-            </a:r>
+              <a:t>scale(</a:t>
+            </a:r>
+            <a:r>
+              <a:rPr lang="en-US" sz="2400" dirty="0" err="1" smtClean="0"/>
+              <a:t>x_scale</a:t>
+            </a:r>
+            <a:r>
+              <a:rPr lang="en-US" sz="2400" dirty="0" smtClean="0"/>
+              <a:t>)</a:t>
+            </a:r>
+            <a:endParaRPr lang="en-US" sz="2400" dirty="0"/>
           </a:p>
           <a:p>
             <a:pPr marL="0" indent="0">
@@ -10855,7 +11189,7 @@
           <a:p>
             <a:fld id="{7053BEFA-1175-F644-B249-7D41D72BD3FF}" type="datetime1">
               <a:rPr lang="en-US" smtClean="0"/>
-              <a:t>2/3/14</a:t>
+              <a:t>2/7/14</a:t>
             </a:fld>
             <a:endParaRPr lang="en-US"/>
           </a:p>
@@ -10912,7 +11246,7 @@
         <p:spPr>
           <a:xfrm>
             <a:off x="1854059" y="2719788"/>
-            <a:ext cx="1673872" cy="538093"/>
+            <a:ext cx="2357526" cy="538093"/>
           </a:xfrm>
           <a:prstGeom prst="rect">
             <a:avLst/>
@@ -10958,8 +11292,8 @@
             <a:avLst>
               <a:gd name="adj1" fmla="val 34225"/>
               <a:gd name="adj2" fmla="val -7051"/>
-              <a:gd name="adj3" fmla="val -9010"/>
-              <a:gd name="adj4" fmla="val -57246"/>
+              <a:gd name="adj3" fmla="val -12202"/>
+              <a:gd name="adj4" fmla="val -39882"/>
             </a:avLst>
           </a:prstGeom>
           <a:ln/>
@@ -11120,8 +11454,17 @@
             </a:r>
             <a:r>
               <a:rPr lang="en-US" sz="2400" dirty="0"/>
-              <a:t>scale(x)</a:t>
-            </a:r>
+              <a:t>scale(</a:t>
+            </a:r>
+            <a:r>
+              <a:rPr lang="en-US" sz="2400" dirty="0" err="1" smtClean="0"/>
+              <a:t>x_scale</a:t>
+            </a:r>
+            <a:r>
+              <a:rPr lang="en-US" sz="2400" dirty="0" smtClean="0"/>
+              <a:t>)</a:t>
+            </a:r>
+            <a:endParaRPr lang="en-US" sz="2400" dirty="0"/>
           </a:p>
           <a:p>
             <a:pPr marL="0" indent="0">
@@ -11299,7 +11642,7 @@
           <a:p>
             <a:fld id="{7053BEFA-1175-F644-B249-7D41D72BD3FF}" type="datetime1">
               <a:rPr lang="en-US" smtClean="0"/>
-              <a:t>2/3/14</a:t>
+              <a:t>2/7/14</a:t>
             </a:fld>
             <a:endParaRPr lang="en-US"/>
           </a:p>
@@ -11447,8 +11790,17 @@
             </a:r>
             <a:r>
               <a:rPr lang="en-US" sz="2400" dirty="0"/>
-              <a:t>scale(x)</a:t>
-            </a:r>
+              <a:t>scale(</a:t>
+            </a:r>
+            <a:r>
+              <a:rPr lang="en-US" sz="2400" dirty="0" err="1" smtClean="0"/>
+              <a:t>x_scale</a:t>
+            </a:r>
+            <a:r>
+              <a:rPr lang="en-US" sz="2400" dirty="0" smtClean="0"/>
+              <a:t>)</a:t>
+            </a:r>
+            <a:endParaRPr lang="en-US" sz="2400" dirty="0"/>
           </a:p>
           <a:p>
             <a:pPr marL="0" indent="0">
@@ -11626,7 +11978,7 @@
           <a:p>
             <a:fld id="{7053BEFA-1175-F644-B249-7D41D72BD3FF}" type="datetime1">
               <a:rPr lang="en-US" smtClean="0"/>
-              <a:t>2/3/14</a:t>
+              <a:t>2/7/14</a:t>
             </a:fld>
             <a:endParaRPr lang="en-US"/>
           </a:p>
@@ -11884,8 +12236,17 @@
             </a:r>
             <a:r>
               <a:rPr lang="en-US" sz="2400" dirty="0"/>
-              <a:t>scale(x)</a:t>
-            </a:r>
+              <a:t>scale(</a:t>
+            </a:r>
+            <a:r>
+              <a:rPr lang="en-US" sz="2400" dirty="0" err="1" smtClean="0"/>
+              <a:t>x_scale</a:t>
+            </a:r>
+            <a:r>
+              <a:rPr lang="en-US" sz="2400" dirty="0" smtClean="0"/>
+              <a:t>)</a:t>
+            </a:r>
+            <a:endParaRPr lang="en-US" sz="2400" dirty="0"/>
           </a:p>
           <a:p>
             <a:pPr marL="0" indent="0">
@@ -12063,7 +12424,7 @@
           <a:p>
             <a:fld id="{7053BEFA-1175-F644-B249-7D41D72BD3FF}" type="datetime1">
               <a:rPr lang="en-US" smtClean="0"/>
-              <a:t>2/3/14</a:t>
+              <a:t>2/7/14</a:t>
             </a:fld>
             <a:endParaRPr lang="en-US"/>
           </a:p>
@@ -12355,7 +12716,7 @@
           <a:p>
             <a:fld id="{7053BEFA-1175-F644-B249-7D41D72BD3FF}" type="datetime1">
               <a:rPr lang="en-US" smtClean="0"/>
-              <a:t>2/3/14</a:t>
+              <a:t>2/7/14</a:t>
             </a:fld>
             <a:endParaRPr lang="en-US"/>
           </a:p>
@@ -12583,7 +12944,7 @@
           <a:p>
             <a:fld id="{7053BEFA-1175-F644-B249-7D41D72BD3FF}" type="datetime1">
               <a:rPr lang="en-US" smtClean="0"/>
-              <a:t>2/3/14</a:t>
+              <a:t>2/7/14</a:t>
             </a:fld>
             <a:endParaRPr lang="en-US"/>
           </a:p>
@@ -12878,7 +13239,7 @@
           <a:p>
             <a:fld id="{7053BEFA-1175-F644-B249-7D41D72BD3FF}" type="datetime1">
               <a:rPr lang="en-US" smtClean="0"/>
-              <a:t>2/3/14</a:t>
+              <a:t>2/7/14</a:t>
             </a:fld>
             <a:endParaRPr lang="en-US"/>
           </a:p>
@@ -13175,7 +13536,7 @@
           <a:p>
             <a:fld id="{7053BEFA-1175-F644-B249-7D41D72BD3FF}" type="datetime1">
               <a:rPr lang="en-US" smtClean="0"/>
-              <a:t>2/3/14</a:t>
+              <a:t>2/7/14</a:t>
             </a:fld>
             <a:endParaRPr lang="en-US"/>
           </a:p>
@@ -13469,7 +13830,7 @@
           <a:p>
             <a:fld id="{7053BEFA-1175-F644-B249-7D41D72BD3FF}" type="datetime1">
               <a:rPr lang="en-US" smtClean="0"/>
-              <a:t>2/3/14</a:t>
+              <a:t>2/7/14</a:t>
             </a:fld>
             <a:endParaRPr lang="en-US"/>
           </a:p>
@@ -13873,7 +14234,7 @@
           <a:p>
             <a:fld id="{7053BEFA-1175-F644-B249-7D41D72BD3FF}" type="datetime1">
               <a:rPr lang="en-US" smtClean="0"/>
-              <a:t>2/3/14</a:t>
+              <a:t>2/7/14</a:t>
             </a:fld>
             <a:endParaRPr lang="en-US"/>
           </a:p>
@@ -14287,7 +14648,7 @@
           <a:p>
             <a:fld id="{7053BEFA-1175-F644-B249-7D41D72BD3FF}" type="datetime1">
               <a:rPr lang="en-US" smtClean="0"/>
-              <a:t>2/3/14</a:t>
+              <a:t>2/7/14</a:t>
             </a:fld>
             <a:endParaRPr lang="en-US"/>
           </a:p>
@@ -14707,7 +15068,7 @@
           <a:p>
             <a:fld id="{7053BEFA-1175-F644-B249-7D41D72BD3FF}" type="datetime1">
               <a:rPr lang="en-US" smtClean="0"/>
-              <a:t>2/3/14</a:t>
+              <a:t>2/7/14</a:t>
             </a:fld>
             <a:endParaRPr lang="en-US"/>
           </a:p>
@@ -15080,12 +15441,16 @@
               <a:t>d) {return </a:t>
             </a:r>
             <a:r>
-              <a:rPr lang="en-US" dirty="0" err="1"/>
-              <a:t>d.x</a:t>
+              <a:rPr lang="en-US" dirty="0" err="1" smtClean="0"/>
+              <a:t>d.y</a:t>
+            </a:r>
+            <a:r>
+              <a:rPr lang="en-US" dirty="0" smtClean="0"/>
+              <a:t>;</a:t>
             </a:r>
             <a:r>
               <a:rPr lang="en-US" dirty="0"/>
-              <a:t>;}</a:t>
+              <a:t>}</a:t>
             </a:r>
             <a:r>
               <a:rPr lang="en-US" dirty="0" smtClean="0"/>
@@ -15129,7 +15494,7 @@
           <a:p>
             <a:fld id="{7053BEFA-1175-F644-B249-7D41D72BD3FF}" type="datetime1">
               <a:rPr lang="en-US" smtClean="0"/>
-              <a:t>2/3/14</a:t>
+              <a:t>2/7/14</a:t>
             </a:fld>
             <a:endParaRPr lang="en-US"/>
           </a:p>
@@ -15659,7 +16024,7 @@
           <a:p>
             <a:fld id="{7053BEFA-1175-F644-B249-7D41D72BD3FF}" type="datetime1">
               <a:rPr lang="en-US" smtClean="0"/>
-              <a:t>2/3/14</a:t>
+              <a:t>2/7/14</a:t>
             </a:fld>
             <a:endParaRPr lang="en-US"/>
           </a:p>
@@ -15717,6 +16082,13 @@
   <p:clrMapOvr>
     <a:masterClrMapping/>
   </p:clrMapOvr>
+  <p:timing>
+    <p:tnLst>
+      <p:par>
+        <p:cTn xmlns:p14="http://schemas.microsoft.com/office/powerpoint/2010/main" id="1" dur="indefinite" restart="never" nodeType="tmRoot"/>
+      </p:par>
+    </p:tnLst>
+  </p:timing>
 </p:sld>
 </file>
 
@@ -16045,7 +16417,7 @@
           <a:p>
             <a:fld id="{7053BEFA-1175-F644-B249-7D41D72BD3FF}" type="datetime1">
               <a:rPr lang="en-US" smtClean="0"/>
-              <a:t>2/3/14</a:t>
+              <a:t>2/7/14</a:t>
             </a:fld>
             <a:endParaRPr lang="en-US"/>
           </a:p>
@@ -16103,6 +16475,13 @@
   <p:clrMapOvr>
     <a:masterClrMapping/>
   </p:clrMapOvr>
+  <p:timing>
+    <p:tnLst>
+      <p:par>
+        <p:cTn xmlns:p14="http://schemas.microsoft.com/office/powerpoint/2010/main" id="1" dur="indefinite" restart="never" nodeType="tmRoot"/>
+      </p:par>
+    </p:tnLst>
+  </p:timing>
 </p:sld>
 </file>
 
@@ -16236,7 +16615,7 @@
           <a:p>
             <a:fld id="{7053BEFA-1175-F644-B249-7D41D72BD3FF}" type="datetime1">
               <a:rPr lang="en-US" smtClean="0"/>
-              <a:t>2/3/14</a:t>
+              <a:t>2/7/14</a:t>
             </a:fld>
             <a:endParaRPr lang="en-US"/>
           </a:p>
@@ -16629,7 +17008,7 @@
           <a:p>
             <a:fld id="{7053BEFA-1175-F644-B249-7D41D72BD3FF}" type="datetime1">
               <a:rPr lang="en-US" smtClean="0"/>
-              <a:t>2/3/14</a:t>
+              <a:t>2/7/14</a:t>
             </a:fld>
             <a:endParaRPr lang="en-US"/>
           </a:p>
@@ -16781,6 +17160,13 @@
   <p:clrMapOvr>
     <a:masterClrMapping/>
   </p:clrMapOvr>
+  <p:timing>
+    <p:tnLst>
+      <p:par>
+        <p:cTn xmlns:p14="http://schemas.microsoft.com/office/powerpoint/2010/main" id="1" dur="indefinite" restart="never" nodeType="tmRoot"/>
+      </p:par>
+    </p:tnLst>
+  </p:timing>
 </p:sld>
 </file>
 
@@ -17109,7 +17495,7 @@
           <a:p>
             <a:fld id="{7053BEFA-1175-F644-B249-7D41D72BD3FF}" type="datetime1">
               <a:rPr lang="en-US" smtClean="0"/>
-              <a:t>2/3/14</a:t>
+              <a:t>2/7/14</a:t>
             </a:fld>
             <a:endParaRPr lang="en-US"/>
           </a:p>
@@ -17261,6 +17647,13 @@
   <p:clrMapOvr>
     <a:masterClrMapping/>
   </p:clrMapOvr>
+  <p:timing>
+    <p:tnLst>
+      <p:par>
+        <p:cTn xmlns:p14="http://schemas.microsoft.com/office/powerpoint/2010/main" id="1" dur="indefinite" restart="never" nodeType="tmRoot"/>
+      </p:par>
+    </p:tnLst>
+  </p:timing>
 </p:sld>
 </file>
 
@@ -17589,7 +17982,7 @@
           <a:p>
             <a:fld id="{7053BEFA-1175-F644-B249-7D41D72BD3FF}" type="datetime1">
               <a:rPr lang="en-US" smtClean="0"/>
-              <a:t>2/3/14</a:t>
+              <a:t>2/7/14</a:t>
             </a:fld>
             <a:endParaRPr lang="en-US"/>
           </a:p>
@@ -17749,6 +18142,13 @@
   <p:clrMapOvr>
     <a:masterClrMapping/>
   </p:clrMapOvr>
+  <p:timing>
+    <p:tnLst>
+      <p:par>
+        <p:cTn xmlns:p14="http://schemas.microsoft.com/office/powerpoint/2010/main" id="1" dur="indefinite" restart="never" nodeType="tmRoot"/>
+      </p:par>
+    </p:tnLst>
+  </p:timing>
 </p:sld>
 </file>
 
@@ -18077,7 +18477,7 @@
           <a:p>
             <a:fld id="{7053BEFA-1175-F644-B249-7D41D72BD3FF}" type="datetime1">
               <a:rPr lang="en-US" smtClean="0"/>
-              <a:t>2/3/14</a:t>
+              <a:t>2/7/14</a:t>
             </a:fld>
             <a:endParaRPr lang="en-US"/>
           </a:p>
@@ -18237,6 +18637,13 @@
   <p:clrMapOvr>
     <a:masterClrMapping/>
   </p:clrMapOvr>
+  <p:timing>
+    <p:tnLst>
+      <p:par>
+        <p:cTn xmlns:p14="http://schemas.microsoft.com/office/powerpoint/2010/main" id="1" dur="indefinite" restart="never" nodeType="tmRoot"/>
+      </p:par>
+    </p:tnLst>
+  </p:timing>
 </p:sld>
 </file>
 
@@ -18565,7 +18972,7 @@
           <a:p>
             <a:fld id="{7053BEFA-1175-F644-B249-7D41D72BD3FF}" type="datetime1">
               <a:rPr lang="en-US" smtClean="0"/>
-              <a:t>2/3/14</a:t>
+              <a:t>2/7/14</a:t>
             </a:fld>
             <a:endParaRPr lang="en-US"/>
           </a:p>
@@ -18717,6 +19124,13 @@
   <p:clrMapOvr>
     <a:masterClrMapping/>
   </p:clrMapOvr>
+  <p:timing>
+    <p:tnLst>
+      <p:par>
+        <p:cTn xmlns:p14="http://schemas.microsoft.com/office/powerpoint/2010/main" id="1" dur="indefinite" restart="never" nodeType="tmRoot"/>
+      </p:par>
+    </p:tnLst>
+  </p:timing>
 </p:sld>
 </file>
 
@@ -19045,7 +19459,7 @@
           <a:p>
             <a:fld id="{7053BEFA-1175-F644-B249-7D41D72BD3FF}" type="datetime1">
               <a:rPr lang="en-US" smtClean="0"/>
-              <a:t>2/3/14</a:t>
+              <a:t>2/7/14</a:t>
             </a:fld>
             <a:endParaRPr lang="en-US"/>
           </a:p>
@@ -19205,6 +19619,13 @@
   <p:clrMapOvr>
     <a:masterClrMapping/>
   </p:clrMapOvr>
+  <p:timing>
+    <p:tnLst>
+      <p:par>
+        <p:cTn xmlns:p14="http://schemas.microsoft.com/office/powerpoint/2010/main" id="1" dur="indefinite" restart="never" nodeType="tmRoot"/>
+      </p:par>
+    </p:tnLst>
+  </p:timing>
 </p:sld>
 </file>
 
@@ -19533,7 +19954,7 @@
           <a:p>
             <a:fld id="{7053BEFA-1175-F644-B249-7D41D72BD3FF}" type="datetime1">
               <a:rPr lang="en-US" smtClean="0"/>
-              <a:t>2/3/14</a:t>
+              <a:t>2/7/14</a:t>
             </a:fld>
             <a:endParaRPr lang="en-US"/>
           </a:p>
@@ -19685,6 +20106,13 @@
   <p:clrMapOvr>
     <a:masterClrMapping/>
   </p:clrMapOvr>
+  <p:timing>
+    <p:tnLst>
+      <p:par>
+        <p:cTn xmlns:p14="http://schemas.microsoft.com/office/powerpoint/2010/main" id="1" dur="indefinite" restart="never" nodeType="tmRoot"/>
+      </p:par>
+    </p:tnLst>
+  </p:timing>
 </p:sld>
 </file>
 
@@ -20013,7 +20441,7 @@
           <a:p>
             <a:fld id="{7053BEFA-1175-F644-B249-7D41D72BD3FF}" type="datetime1">
               <a:rPr lang="en-US" smtClean="0"/>
-              <a:t>2/3/14</a:t>
+              <a:t>2/7/14</a:t>
             </a:fld>
             <a:endParaRPr lang="en-US"/>
           </a:p>
@@ -20173,6 +20601,13 @@
   <p:clrMapOvr>
     <a:masterClrMapping/>
   </p:clrMapOvr>
+  <p:timing>
+    <p:tnLst>
+      <p:par>
+        <p:cTn xmlns:p14="http://schemas.microsoft.com/office/powerpoint/2010/main" id="1" dur="indefinite" restart="never" nodeType="tmRoot"/>
+      </p:par>
+    </p:tnLst>
+  </p:timing>
 </p:sld>
 </file>
 
@@ -20258,7 +20693,7 @@
           <a:p>
             <a:fld id="{7053BEFA-1175-F644-B249-7D41D72BD3FF}" type="datetime1">
               <a:rPr lang="en-US" smtClean="0"/>
-              <a:t>2/3/14</a:t>
+              <a:t>2/7/14</a:t>
             </a:fld>
             <a:endParaRPr lang="en-US"/>
           </a:p>
@@ -20316,6 +20751,13 @@
   <p:clrMapOvr>
     <a:masterClrMapping/>
   </p:clrMapOvr>
+  <p:timing>
+    <p:tnLst>
+      <p:par>
+        <p:cTn xmlns:p14="http://schemas.microsoft.com/office/powerpoint/2010/main" id="1" dur="indefinite" restart="never" nodeType="tmRoot"/>
+      </p:par>
+    </p:tnLst>
+  </p:timing>
 </p:sld>
 </file>
 
@@ -20358,11 +20800,7 @@
           <a:p>
             <a:r>
               <a:rPr lang="en-US" dirty="0" smtClean="0"/>
-              <a:t>Creating Stacked </a:t>
-            </a:r>
-            <a:r>
-              <a:rPr lang="en-US" dirty="0" smtClean="0"/>
-              <a:t>Bars</a:t>
+              <a:t>Creating Stacked Bars</a:t>
             </a:r>
             <a:endParaRPr lang="en-US" dirty="0"/>
           </a:p>
@@ -20380,8 +20818,8 @@
         </p:nvSpPr>
         <p:spPr>
           <a:xfrm>
-            <a:off x="562043" y="1847153"/>
-            <a:ext cx="7887140" cy="4379976"/>
+            <a:off x="562042" y="1847153"/>
+            <a:ext cx="8581957" cy="4379976"/>
           </a:xfrm>
         </p:spPr>
         <p:txBody>
@@ -20495,10 +20933,14 @@
             </a:r>
             <a:r>
               <a:rPr lang="en-US" sz="2400" dirty="0" smtClean="0"/>
-              <a:t>return x</a:t>
-            </a:r>
-            <a:r>
-              <a:rPr lang="en-US" sz="2400" dirty="0"/>
+              <a:t>return </a:t>
+            </a:r>
+            <a:r>
+              <a:rPr lang="en-US" sz="2400" dirty="0" err="1" smtClean="0"/>
+              <a:t>x_scale</a:t>
+            </a:r>
+            <a:r>
+              <a:rPr lang="en-US" sz="2400" dirty="0" smtClean="0"/>
               <a:t>(</a:t>
             </a:r>
             <a:r>
@@ -20528,10 +20970,14 @@
             </a:r>
             <a:r>
               <a:rPr lang="en-US" sz="2400" dirty="0" smtClean="0"/>
-              <a:t>				x</a:t>
-            </a:r>
-            <a:r>
-              <a:rPr lang="en-US" sz="2400" dirty="0"/>
+              <a:t>				</a:t>
+            </a:r>
+            <a:r>
+              <a:rPr lang="en-US" sz="2400" dirty="0" err="1" smtClean="0"/>
+              <a:t>x_scale</a:t>
+            </a:r>
+            <a:r>
+              <a:rPr lang="en-US" sz="2400" dirty="0" smtClean="0"/>
               <a:t>(</a:t>
             </a:r>
             <a:r>
@@ -20562,7 +21008,7 @@
           <a:p>
             <a:fld id="{7053BEFA-1175-F644-B249-7D41D72BD3FF}" type="datetime1">
               <a:rPr lang="en-US" smtClean="0"/>
-              <a:t>2/3/14</a:t>
+              <a:t>2/7/14</a:t>
             </a:fld>
             <a:endParaRPr lang="en-US"/>
           </a:p>
@@ -20728,17 +21174,35 @@
             </a:pPr>
             <a:r>
               <a:rPr lang="en-US" sz="1600" dirty="0"/>
-              <a:t>&lt;!DOCTYPE html&gt;</a:t>
-            </a:r>
-          </a:p>
-          <a:p>
-            <a:pPr marL="228600" lvl="1" indent="0">
-              <a:buNone/>
-            </a:pPr>
+              <a:t>&lt;!DOCTYPE html</a:t>
+            </a:r>
+            <a:r>
+              <a:rPr lang="en-US" sz="1600" dirty="0" smtClean="0"/>
+              <a:t>&gt;</a:t>
+            </a:r>
+            <a:br>
+              <a:rPr lang="en-US" sz="1600" dirty="0" smtClean="0"/>
+            </a:br>
+            <a:r>
+              <a:rPr lang="en-US" sz="1600" dirty="0" smtClean="0"/>
+              <a:t>&lt;</a:t>
+            </a:r>
             <a:r>
               <a:rPr lang="en-US" sz="1600" dirty="0"/>
-              <a:t>&lt;meta charset="utf-8"&gt;</a:t>
-            </a:r>
+              <a:t>meta charset="utf-</a:t>
+            </a:r>
+            <a:r>
+              <a:rPr lang="en-US" sz="1600" dirty="0" smtClean="0"/>
+              <a:t>8”&gt;</a:t>
+            </a:r>
+            <a:br>
+              <a:rPr lang="en-US" sz="1600" dirty="0" smtClean="0"/>
+            </a:br>
+            <a:r>
+              <a:rPr lang="en-US" sz="1600" dirty="0" smtClean="0"/>
+              <a:t>&lt;body&gt;</a:t>
+            </a:r>
+            <a:endParaRPr lang="en-US" sz="1600" dirty="0"/>
           </a:p>
           <a:p>
             <a:pPr marL="228600" lvl="1" indent="0">
@@ -20793,7 +21257,7 @@
               <a:t>="</a:t>
             </a:r>
             <a:r>
-              <a:rPr lang="en-US" sz="1600" b="1" dirty="0">
+              <a:rPr lang="en-US" sz="1600" b="1" dirty="0" smtClean="0">
                 <a:solidFill>
                   <a:schemeClr val="accent2"/>
                 </a:solidFill>
@@ -20801,17 +21265,19 @@
               <a:t>500</a:t>
             </a:r>
             <a:r>
+              <a:rPr lang="en-US" sz="1600" b="1" dirty="0" smtClean="0"/>
+              <a:t>”&gt;</a:t>
+            </a:r>
+            <a:br>
+              <a:rPr lang="en-US" sz="1600" b="1" dirty="0" smtClean="0"/>
+            </a:br>
+            <a:r>
+              <a:rPr lang="en-US" sz="1600" b="1" dirty="0" smtClean="0"/>
+              <a:t>  </a:t>
+            </a:r>
+            <a:r>
               <a:rPr lang="en-US" sz="1600" b="1" dirty="0"/>
-              <a:t>"&gt;</a:t>
-            </a:r>
-          </a:p>
-          <a:p>
-            <a:pPr marL="228600" lvl="1" indent="0">
-              <a:buNone/>
-            </a:pPr>
-            <a:r>
-              <a:rPr lang="en-US" sz="1600" b="1" dirty="0"/>
-              <a:t>  &lt;text </a:t>
+              <a:t>&lt;text </a:t>
             </a:r>
             <a:r>
               <a:rPr lang="en-US" sz="1600" b="1" dirty="0">
@@ -20826,7 +21292,7 @@
               <a:t>="</a:t>
             </a:r>
             <a:r>
-              <a:rPr lang="en-US" sz="1600" b="1" dirty="0">
+              <a:rPr lang="en-US" sz="1600" b="1" dirty="0" smtClean="0">
                 <a:solidFill>
                   <a:schemeClr val="accent2"/>
                 </a:solidFill>
@@ -20834,17 +21300,23 @@
               <a:t>12</a:t>
             </a:r>
             <a:r>
-              <a:rPr lang="en-US" sz="1600" b="1" dirty="0"/>
-              <a:t>"&gt;</a:t>
-            </a:r>
-          </a:p>
-          <a:p>
-            <a:pPr marL="228600" lvl="1" indent="0">
-              <a:buNone/>
-            </a:pPr>
-            <a:r>
-              <a:rPr lang="en-US" sz="1600" b="1" dirty="0"/>
+              <a:rPr lang="en-US" sz="1600" b="1" dirty="0" smtClean="0"/>
+              <a:t>”&gt;</a:t>
+            </a:r>
+            <a:br>
+              <a:rPr lang="en-US" sz="1600" b="1" dirty="0" smtClean="0"/>
+            </a:br>
+            <a:r>
+              <a:rPr lang="en-US" sz="1600" b="1" dirty="0" smtClean="0"/>
               <a:t>   </a:t>
+            </a:r>
+            <a:r>
+              <a:rPr lang="en-US" sz="1600" b="1" dirty="0" smtClean="0">
+                <a:solidFill>
+                  <a:srgbClr val="008000"/>
+                </a:solidFill>
+              </a:rPr>
+              <a:t> </a:t>
             </a:r>
             <a:r>
               <a:rPr lang="en-US" sz="1600" b="1" dirty="0">
@@ -20852,35 +21324,64 @@
                   <a:srgbClr val="008000"/>
                 </a:solidFill>
               </a:rPr>
-              <a:t> Hello, world!</a:t>
-            </a:r>
-          </a:p>
-          <a:p>
-            <a:pPr marL="228600" lvl="1" indent="0">
-              <a:buNone/>
-            </a:pPr>
+              <a:t>Hello, world</a:t>
+            </a:r>
+            <a:r>
+              <a:rPr lang="en-US" sz="1600" b="1" dirty="0" smtClean="0">
+                <a:solidFill>
+                  <a:srgbClr val="008000"/>
+                </a:solidFill>
+              </a:rPr>
+              <a:t>!</a:t>
+            </a:r>
+            <a:br>
+              <a:rPr lang="en-US" sz="1600" b="1" dirty="0" smtClean="0">
+                <a:solidFill>
+                  <a:srgbClr val="008000"/>
+                </a:solidFill>
+              </a:rPr>
+            </a:br>
+            <a:r>
+              <a:rPr lang="en-US" sz="1600" b="1" dirty="0" smtClean="0"/>
+              <a:t>  </a:t>
+            </a:r>
             <a:r>
               <a:rPr lang="en-US" sz="1600" b="1" dirty="0"/>
-              <a:t>  &lt;/text&gt;</a:t>
-            </a:r>
-          </a:p>
-          <a:p>
-            <a:pPr marL="228600" lvl="1" indent="0">
-              <a:buNone/>
-            </a:pPr>
+              <a:t>&lt;/text</a:t>
+            </a:r>
+            <a:r>
+              <a:rPr lang="en-US" sz="1600" b="1" dirty="0" smtClean="0"/>
+              <a:t>&gt;</a:t>
+            </a:r>
+            <a:br>
+              <a:rPr lang="en-US" sz="1600" b="1" dirty="0" smtClean="0"/>
+            </a:br>
+            <a:r>
+              <a:rPr lang="en-US" sz="1600" b="1" dirty="0" smtClean="0"/>
+              <a:t>&lt;</a:t>
+            </a:r>
             <a:r>
               <a:rPr lang="en-US" sz="1600" b="1" dirty="0"/>
-              <a:t>&lt;/</a:t>
+              <a:t>/</a:t>
             </a:r>
             <a:r>
               <a:rPr lang="en-US" sz="1600" b="1" dirty="0" err="1"/>
               <a:t>svg</a:t>
             </a:r>
             <a:r>
-              <a:rPr lang="en-US" sz="1600" b="1" dirty="0"/>
+              <a:rPr lang="en-US" sz="1600" b="1" dirty="0" smtClean="0"/>
               <a:t>&gt;</a:t>
             </a:r>
-            <a:endParaRPr lang="en-US" b="1" dirty="0"/>
+          </a:p>
+          <a:p>
+            <a:pPr marL="228600" lvl="1" indent="0">
+              <a:buNone/>
+            </a:pPr>
+            <a:r>
+              <a:rPr lang="en-US" sz="1600" dirty="0" smtClean="0"/>
+              <a:t>&lt;/body&gt;</a:t>
+            </a:r>
+            <a:endParaRPr lang="en-US" dirty="0"/>
           </a:p>
         </p:txBody>
       </p:sp>
@@ -20901,7 +21402,7 @@
           <a:p>
             <a:fld id="{7053BEFA-1175-F644-B249-7D41D72BD3FF}" type="datetime1">
               <a:rPr lang="en-US" smtClean="0"/>
-              <a:t>2/3/14</a:t>
+              <a:t>2/7/14</a:t>
             </a:fld>
             <a:endParaRPr lang="en-US"/>
           </a:p>
@@ -21026,8 +21527,8 @@
         </p:nvSpPr>
         <p:spPr>
           <a:xfrm>
-            <a:off x="1128943" y="1847153"/>
-            <a:ext cx="7887140" cy="4379976"/>
+            <a:off x="701296" y="1847153"/>
+            <a:ext cx="9004780" cy="4379976"/>
           </a:xfrm>
         </p:spPr>
         <p:txBody>
@@ -21141,10 +21642,14 @@
             </a:r>
             <a:r>
               <a:rPr lang="en-US" sz="2400" dirty="0" smtClean="0"/>
-              <a:t>return x</a:t>
-            </a:r>
-            <a:r>
-              <a:rPr lang="en-US" sz="2400" dirty="0"/>
+              <a:t>return </a:t>
+            </a:r>
+            <a:r>
+              <a:rPr lang="en-US" sz="2400" dirty="0" err="1" smtClean="0"/>
+              <a:t>x_scale</a:t>
+            </a:r>
+            <a:r>
+              <a:rPr lang="en-US" sz="2400" dirty="0" smtClean="0"/>
               <a:t>(</a:t>
             </a:r>
             <a:r>
@@ -21174,10 +21679,14 @@
             </a:r>
             <a:r>
               <a:rPr lang="en-US" sz="2400" dirty="0" smtClean="0"/>
-              <a:t>				x</a:t>
-            </a:r>
-            <a:r>
-              <a:rPr lang="en-US" sz="2400" dirty="0"/>
+              <a:t>				</a:t>
+            </a:r>
+            <a:r>
+              <a:rPr lang="en-US" sz="2400" dirty="0" err="1" smtClean="0"/>
+              <a:t>x_scale</a:t>
+            </a:r>
+            <a:r>
+              <a:rPr lang="en-US" sz="2400" dirty="0" smtClean="0"/>
               <a:t>(</a:t>
             </a:r>
             <a:r>
@@ -21208,7 +21717,7 @@
           <a:p>
             <a:fld id="{7053BEFA-1175-F644-B249-7D41D72BD3FF}" type="datetime1">
               <a:rPr lang="en-US" smtClean="0"/>
-              <a:t>2/3/14</a:t>
+              <a:t>2/7/14</a:t>
             </a:fld>
             <a:endParaRPr lang="en-US"/>
           </a:p>
@@ -21264,7 +21773,7 @@
         </p:nvSpPr>
         <p:spPr>
           <a:xfrm>
-            <a:off x="2476620" y="3164727"/>
+            <a:off x="2048973" y="3164727"/>
             <a:ext cx="2169136" cy="745930"/>
           </a:xfrm>
           <a:prstGeom prst="rect">
@@ -21304,7 +21813,7 @@
         </p:nvSpPr>
         <p:spPr>
           <a:xfrm>
-            <a:off x="6264636" y="2432182"/>
+            <a:off x="5836989" y="2432182"/>
             <a:ext cx="2441101" cy="1478475"/>
           </a:xfrm>
           <a:prstGeom prst="borderCallout1">
@@ -21358,7 +21867,7 @@
         </p:nvSpPr>
         <p:spPr>
           <a:xfrm>
-            <a:off x="3713588" y="2197893"/>
+            <a:off x="3285941" y="2197893"/>
             <a:ext cx="2169136" cy="745930"/>
           </a:xfrm>
           <a:prstGeom prst="rect">
@@ -21429,6 +21938,191 @@
       </p:grpSpPr>
       <p:sp>
         <p:nvSpPr>
+          <p:cNvPr id="13" name="Content Placeholder 2"/>
+          <p:cNvSpPr>
+            <a:spLocks noGrp="1"/>
+          </p:cNvSpPr>
+          <p:nvPr>
+            <p:ph idx="1"/>
+          </p:nvPr>
+        </p:nvSpPr>
+        <p:spPr>
+          <a:xfrm>
+            <a:off x="701296" y="1847153"/>
+            <a:ext cx="9004780" cy="4379976"/>
+          </a:xfrm>
+        </p:spPr>
+        <p:txBody>
+          <a:bodyPr/>
+          <a:lstStyle/>
+          <a:p>
+            <a:pPr marL="0" indent="0">
+              <a:buNone/>
+            </a:pPr>
+            <a:r>
+              <a:rPr lang="en-US" sz="2400" dirty="0"/>
+              <a:t> // The selection '.age' will correspond to the data</a:t>
+            </a:r>
+          </a:p>
+          <a:p>
+            <a:pPr marL="0" indent="0">
+              <a:buNone/>
+            </a:pPr>
+            <a:r>
+              <a:rPr lang="en-US" sz="2400" dirty="0" err="1" smtClean="0"/>
+              <a:t>var</a:t>
+            </a:r>
+            <a:r>
+              <a:rPr lang="en-US" sz="2400" dirty="0" smtClean="0"/>
+              <a:t> </a:t>
+            </a:r>
+            <a:r>
+              <a:rPr lang="en-US" sz="2400" dirty="0"/>
+              <a:t>age = </a:t>
+            </a:r>
+            <a:r>
+              <a:rPr lang="en-US" sz="2400" dirty="0" err="1"/>
+              <a:t>svg.selectAll</a:t>
+            </a:r>
+            <a:r>
+              <a:rPr lang="en-US" sz="2400" dirty="0"/>
+              <a:t>(".Age")</a:t>
+            </a:r>
+          </a:p>
+          <a:p>
+            <a:pPr marL="0" indent="0">
+              <a:buNone/>
+            </a:pPr>
+            <a:r>
+              <a:rPr lang="en-US" sz="2400" dirty="0" smtClean="0"/>
+              <a:t>		.</a:t>
+            </a:r>
+            <a:r>
+              <a:rPr lang="en-US" sz="2400" dirty="0"/>
+              <a:t>data(data)</a:t>
+            </a:r>
+          </a:p>
+          <a:p>
+            <a:pPr marL="0" indent="0">
+              <a:buNone/>
+            </a:pPr>
+            <a:r>
+              <a:rPr lang="en-US" sz="2400" dirty="0" smtClean="0"/>
+              <a:t>	.</a:t>
+            </a:r>
+            <a:r>
+              <a:rPr lang="en-US" sz="2400" dirty="0"/>
+              <a:t>enter().append("g"</a:t>
+            </a:r>
+            <a:r>
+              <a:rPr lang="en-US" sz="2400" dirty="0" smtClean="0"/>
+              <a:t>)  </a:t>
+            </a:r>
+            <a:endParaRPr lang="en-US" sz="2400" dirty="0"/>
+          </a:p>
+          <a:p>
+            <a:pPr marL="0" indent="0">
+              <a:buNone/>
+            </a:pPr>
+            <a:r>
+              <a:rPr lang="en-US" sz="2400" dirty="0"/>
+              <a:t>           .</a:t>
+            </a:r>
+            <a:r>
+              <a:rPr lang="en-US" sz="2400" dirty="0" err="1"/>
+              <a:t>attr</a:t>
+            </a:r>
+            <a:r>
+              <a:rPr lang="en-US" sz="2400" dirty="0"/>
+              <a:t>("class", "g")</a:t>
+            </a:r>
+          </a:p>
+          <a:p>
+            <a:pPr marL="0" indent="0">
+              <a:buNone/>
+            </a:pPr>
+            <a:r>
+              <a:rPr lang="en-US" sz="2400" dirty="0"/>
+              <a:t>           .</a:t>
+            </a:r>
+            <a:r>
+              <a:rPr lang="en-US" sz="2400" dirty="0" err="1"/>
+              <a:t>attr</a:t>
+            </a:r>
+            <a:r>
+              <a:rPr lang="en-US" sz="2400" dirty="0"/>
+              <a:t>("</a:t>
+            </a:r>
+            <a:r>
+              <a:rPr lang="en-US" sz="2400" dirty="0" err="1"/>
+              <a:t>x_position</a:t>
+            </a:r>
+            <a:r>
+              <a:rPr lang="en-US" sz="2400" dirty="0"/>
+              <a:t>", function (d) {</a:t>
+            </a:r>
+            <a:r>
+              <a:rPr lang="en-US" sz="2400" dirty="0" smtClean="0"/>
+              <a:t>return </a:t>
+            </a:r>
+            <a:r>
+              <a:rPr lang="en-US" sz="2400" dirty="0" err="1" smtClean="0"/>
+              <a:t>x_scale</a:t>
+            </a:r>
+            <a:r>
+              <a:rPr lang="en-US" sz="2400" dirty="0" smtClean="0"/>
+              <a:t>(</a:t>
+            </a:r>
+            <a:r>
+              <a:rPr lang="en-US" sz="2400" dirty="0" err="1"/>
+              <a:t>d.Age</a:t>
+            </a:r>
+            <a:r>
+              <a:rPr lang="en-US" sz="2400" dirty="0"/>
+              <a:t>);})</a:t>
+            </a:r>
+          </a:p>
+          <a:p>
+            <a:pPr marL="0" indent="0">
+              <a:buNone/>
+            </a:pPr>
+            <a:r>
+              <a:rPr lang="en-US" sz="2400" dirty="0"/>
+              <a:t>           .</a:t>
+            </a:r>
+            <a:r>
+              <a:rPr lang="en-US" sz="2400" dirty="0" err="1"/>
+              <a:t>attr</a:t>
+            </a:r>
+            <a:r>
+              <a:rPr lang="en-US" sz="2400" dirty="0"/>
+              <a:t>("transform", function(d) {return "translate(" + </a:t>
+            </a:r>
+            <a:r>
+              <a:rPr lang="en-US" sz="2400" dirty="0" smtClean="0"/>
+              <a:t>				</a:t>
+            </a:r>
+            <a:r>
+              <a:rPr lang="en-US" sz="2400" dirty="0" err="1" smtClean="0"/>
+              <a:t>x_scale</a:t>
+            </a:r>
+            <a:r>
+              <a:rPr lang="en-US" sz="2400" dirty="0" smtClean="0"/>
+              <a:t>(</a:t>
+            </a:r>
+            <a:r>
+              <a:rPr lang="en-US" sz="2400" dirty="0" err="1"/>
+              <a:t>d.Age</a:t>
+            </a:r>
+            <a:r>
+              <a:rPr lang="en-US" sz="2400" dirty="0"/>
+              <a:t>) + ",0)"; });</a:t>
+            </a:r>
+          </a:p>
+        </p:txBody>
+      </p:sp>
+      <p:sp>
+        <p:nvSpPr>
           <p:cNvPr id="2" name="Title 1"/>
           <p:cNvSpPr>
             <a:spLocks noGrp="1"/>
@@ -21457,183 +22151,6 @@
       </p:sp>
       <p:sp>
         <p:nvSpPr>
-          <p:cNvPr id="3" name="Content Placeholder 2"/>
-          <p:cNvSpPr>
-            <a:spLocks noGrp="1"/>
-          </p:cNvSpPr>
-          <p:nvPr>
-            <p:ph idx="1"/>
-          </p:nvPr>
-        </p:nvSpPr>
-        <p:spPr>
-          <a:xfrm>
-            <a:off x="1128943" y="1847153"/>
-            <a:ext cx="7887140" cy="4379976"/>
-          </a:xfrm>
-        </p:spPr>
-        <p:txBody>
-          <a:bodyPr/>
-          <a:lstStyle/>
-          <a:p>
-            <a:pPr marL="0" indent="0">
-              <a:buNone/>
-            </a:pPr>
-            <a:r>
-              <a:rPr lang="en-US" sz="2400" dirty="0"/>
-              <a:t> // The selection '.age' will correspond to the data</a:t>
-            </a:r>
-          </a:p>
-          <a:p>
-            <a:pPr marL="0" indent="0">
-              <a:buNone/>
-            </a:pPr>
-            <a:r>
-              <a:rPr lang="en-US" sz="2400" dirty="0" err="1" smtClean="0"/>
-              <a:t>var</a:t>
-            </a:r>
-            <a:r>
-              <a:rPr lang="en-US" sz="2400" dirty="0" smtClean="0"/>
-              <a:t> </a:t>
-            </a:r>
-            <a:r>
-              <a:rPr lang="en-US" sz="2400" dirty="0"/>
-              <a:t>age = </a:t>
-            </a:r>
-            <a:r>
-              <a:rPr lang="en-US" sz="2400" dirty="0" err="1"/>
-              <a:t>svg.selectAll</a:t>
-            </a:r>
-            <a:r>
-              <a:rPr lang="en-US" sz="2400" dirty="0"/>
-              <a:t>(".Age")</a:t>
-            </a:r>
-          </a:p>
-          <a:p>
-            <a:pPr marL="0" indent="0">
-              <a:buNone/>
-            </a:pPr>
-            <a:r>
-              <a:rPr lang="en-US" sz="2400" dirty="0" smtClean="0"/>
-              <a:t>		.</a:t>
-            </a:r>
-            <a:r>
-              <a:rPr lang="en-US" sz="2400" dirty="0"/>
-              <a:t>data(data)</a:t>
-            </a:r>
-          </a:p>
-          <a:p>
-            <a:pPr marL="0" indent="0">
-              <a:buNone/>
-            </a:pPr>
-            <a:r>
-              <a:rPr lang="en-US" sz="2400" dirty="0" smtClean="0"/>
-              <a:t>	.</a:t>
-            </a:r>
-            <a:r>
-              <a:rPr lang="en-US" sz="2400" dirty="0"/>
-              <a:t>enter().append("g"</a:t>
-            </a:r>
-            <a:r>
-              <a:rPr lang="en-US" sz="2400" dirty="0" smtClean="0"/>
-              <a:t>)  </a:t>
-            </a:r>
-            <a:endParaRPr lang="en-US" sz="2400" dirty="0"/>
-          </a:p>
-          <a:p>
-            <a:pPr marL="0" indent="0">
-              <a:buNone/>
-            </a:pPr>
-            <a:r>
-              <a:rPr lang="en-US" sz="2400" dirty="0"/>
-              <a:t>           .</a:t>
-            </a:r>
-            <a:r>
-              <a:rPr lang="en-US" sz="2400" dirty="0" err="1"/>
-              <a:t>attr</a:t>
-            </a:r>
-            <a:r>
-              <a:rPr lang="en-US" sz="2400" dirty="0"/>
-              <a:t>("class", "g")</a:t>
-            </a:r>
-          </a:p>
-          <a:p>
-            <a:pPr marL="0" indent="0">
-              <a:buNone/>
-            </a:pPr>
-            <a:r>
-              <a:rPr lang="en-US" sz="2400" dirty="0"/>
-              <a:t>           .</a:t>
-            </a:r>
-            <a:r>
-              <a:rPr lang="en-US" sz="2400" dirty="0" err="1"/>
-              <a:t>attr</a:t>
-            </a:r>
-            <a:r>
-              <a:rPr lang="en-US" sz="2400" dirty="0"/>
-              <a:t>("</a:t>
-            </a:r>
-            <a:r>
-              <a:rPr lang="en-US" sz="2400" dirty="0" err="1"/>
-              <a:t>x_position</a:t>
-            </a:r>
-            <a:r>
-              <a:rPr lang="en-US" sz="2400" dirty="0"/>
-              <a:t>", function (d) {</a:t>
-            </a:r>
-            <a:r>
-              <a:rPr lang="en-US" sz="2400" dirty="0" smtClean="0"/>
-              <a:t>return x</a:t>
-            </a:r>
-            <a:r>
-              <a:rPr lang="en-US" sz="2400" dirty="0"/>
-              <a:t>(</a:t>
-            </a:r>
-            <a:r>
-              <a:rPr lang="en-US" sz="2400" dirty="0" err="1"/>
-              <a:t>d.Age</a:t>
-            </a:r>
-            <a:r>
-              <a:rPr lang="en-US" sz="2400" dirty="0"/>
-              <a:t>);})</a:t>
-            </a:r>
-          </a:p>
-          <a:p>
-            <a:pPr marL="0" indent="0">
-              <a:buNone/>
-            </a:pPr>
-            <a:r>
-              <a:rPr lang="en-US" sz="2400" dirty="0"/>
-              <a:t>           .</a:t>
-            </a:r>
-            <a:r>
-              <a:rPr lang="en-US" sz="2400" dirty="0" err="1"/>
-              <a:t>attr</a:t>
-            </a:r>
-            <a:r>
-              <a:rPr lang="en-US" sz="2400" dirty="0"/>
-              <a:t>("transform", function(d) {return "translate(" + </a:t>
-            </a:r>
-            <a:r>
-              <a:rPr lang="en-US" sz="2400" dirty="0" smtClean="0"/>
-              <a:t>				x</a:t>
-            </a:r>
-            <a:r>
-              <a:rPr lang="en-US" sz="2400" dirty="0"/>
-              <a:t>(</a:t>
-            </a:r>
-            <a:r>
-              <a:rPr lang="en-US" sz="2400" dirty="0" err="1"/>
-              <a:t>d.Age</a:t>
-            </a:r>
-            <a:r>
-              <a:rPr lang="en-US" sz="2400" dirty="0"/>
-              <a:t>) + ",0)"; });</a:t>
-            </a:r>
-          </a:p>
-        </p:txBody>
-      </p:sp>
-      <p:sp>
-        <p:nvSpPr>
           <p:cNvPr id="4" name="Date Placeholder 3"/>
           <p:cNvSpPr>
             <a:spLocks noGrp="1"/>
@@ -21649,7 +22166,7 @@
           <a:p>
             <a:fld id="{7053BEFA-1175-F644-B249-7D41D72BD3FF}" type="datetime1">
               <a:rPr lang="en-US" smtClean="0"/>
-              <a:t>2/3/14</a:t>
+              <a:t>2/7/14</a:t>
             </a:fld>
             <a:endParaRPr lang="en-US"/>
           </a:p>
@@ -21705,8 +22222,8 @@
         </p:nvSpPr>
         <p:spPr>
           <a:xfrm>
-            <a:off x="4191001" y="4068724"/>
-            <a:ext cx="4355598" cy="580403"/>
+            <a:off x="5559292" y="4068724"/>
+            <a:ext cx="3440871" cy="580403"/>
           </a:xfrm>
           <a:prstGeom prst="rect">
             <a:avLst/>
@@ -21745,15 +22262,15 @@
         </p:nvSpPr>
         <p:spPr>
           <a:xfrm>
-            <a:off x="6264636" y="2432182"/>
+            <a:off x="6718201" y="2432182"/>
             <a:ext cx="2441101" cy="1478475"/>
           </a:xfrm>
           <a:prstGeom prst="borderCallout1">
             <a:avLst>
               <a:gd name="adj1" fmla="val 58987"/>
               <a:gd name="adj2" fmla="val -5940"/>
-              <a:gd name="adj3" fmla="val 99351"/>
-              <a:gd name="adj4" fmla="val -56923"/>
+              <a:gd name="adj3" fmla="val 102857"/>
+              <a:gd name="adj4" fmla="val -25603"/>
             </a:avLst>
           </a:prstGeom>
           <a:ln/>
@@ -21928,6 +22445,191 @@
       </p:grpSpPr>
       <p:sp>
         <p:nvSpPr>
+          <p:cNvPr id="10" name="Content Placeholder 2"/>
+          <p:cNvSpPr>
+            <a:spLocks noGrp="1"/>
+          </p:cNvSpPr>
+          <p:nvPr>
+            <p:ph idx="1"/>
+          </p:nvPr>
+        </p:nvSpPr>
+        <p:spPr>
+          <a:xfrm>
+            <a:off x="701296" y="1847153"/>
+            <a:ext cx="9004780" cy="4379976"/>
+          </a:xfrm>
+        </p:spPr>
+        <p:txBody>
+          <a:bodyPr/>
+          <a:lstStyle/>
+          <a:p>
+            <a:pPr marL="0" indent="0">
+              <a:buNone/>
+            </a:pPr>
+            <a:r>
+              <a:rPr lang="en-US" sz="2400" dirty="0"/>
+              <a:t> // The selection '.age' will correspond to the data</a:t>
+            </a:r>
+          </a:p>
+          <a:p>
+            <a:pPr marL="0" indent="0">
+              <a:buNone/>
+            </a:pPr>
+            <a:r>
+              <a:rPr lang="en-US" sz="2400" dirty="0" err="1" smtClean="0"/>
+              <a:t>var</a:t>
+            </a:r>
+            <a:r>
+              <a:rPr lang="en-US" sz="2400" dirty="0" smtClean="0"/>
+              <a:t> </a:t>
+            </a:r>
+            <a:r>
+              <a:rPr lang="en-US" sz="2400" dirty="0"/>
+              <a:t>age = </a:t>
+            </a:r>
+            <a:r>
+              <a:rPr lang="en-US" sz="2400" dirty="0" err="1"/>
+              <a:t>svg.selectAll</a:t>
+            </a:r>
+            <a:r>
+              <a:rPr lang="en-US" sz="2400" dirty="0"/>
+              <a:t>(".Age")</a:t>
+            </a:r>
+          </a:p>
+          <a:p>
+            <a:pPr marL="0" indent="0">
+              <a:buNone/>
+            </a:pPr>
+            <a:r>
+              <a:rPr lang="en-US" sz="2400" dirty="0" smtClean="0"/>
+              <a:t>		.</a:t>
+            </a:r>
+            <a:r>
+              <a:rPr lang="en-US" sz="2400" dirty="0"/>
+              <a:t>data(data)</a:t>
+            </a:r>
+          </a:p>
+          <a:p>
+            <a:pPr marL="0" indent="0">
+              <a:buNone/>
+            </a:pPr>
+            <a:r>
+              <a:rPr lang="en-US" sz="2400" dirty="0" smtClean="0"/>
+              <a:t>	.</a:t>
+            </a:r>
+            <a:r>
+              <a:rPr lang="en-US" sz="2400" dirty="0"/>
+              <a:t>enter().append("g"</a:t>
+            </a:r>
+            <a:r>
+              <a:rPr lang="en-US" sz="2400" dirty="0" smtClean="0"/>
+              <a:t>)  </a:t>
+            </a:r>
+            <a:endParaRPr lang="en-US" sz="2400" dirty="0"/>
+          </a:p>
+          <a:p>
+            <a:pPr marL="0" indent="0">
+              <a:buNone/>
+            </a:pPr>
+            <a:r>
+              <a:rPr lang="en-US" sz="2400" dirty="0"/>
+              <a:t>           .</a:t>
+            </a:r>
+            <a:r>
+              <a:rPr lang="en-US" sz="2400" dirty="0" err="1"/>
+              <a:t>attr</a:t>
+            </a:r>
+            <a:r>
+              <a:rPr lang="en-US" sz="2400" dirty="0"/>
+              <a:t>("class", "g")</a:t>
+            </a:r>
+          </a:p>
+          <a:p>
+            <a:pPr marL="0" indent="0">
+              <a:buNone/>
+            </a:pPr>
+            <a:r>
+              <a:rPr lang="en-US" sz="2400" dirty="0"/>
+              <a:t>           .</a:t>
+            </a:r>
+            <a:r>
+              <a:rPr lang="en-US" sz="2400" dirty="0" err="1"/>
+              <a:t>attr</a:t>
+            </a:r>
+            <a:r>
+              <a:rPr lang="en-US" sz="2400" dirty="0"/>
+              <a:t>("</a:t>
+            </a:r>
+            <a:r>
+              <a:rPr lang="en-US" sz="2400" dirty="0" err="1"/>
+              <a:t>x_position</a:t>
+            </a:r>
+            <a:r>
+              <a:rPr lang="en-US" sz="2400" dirty="0"/>
+              <a:t>", function (d) {</a:t>
+            </a:r>
+            <a:r>
+              <a:rPr lang="en-US" sz="2400" dirty="0" smtClean="0"/>
+              <a:t>return </a:t>
+            </a:r>
+            <a:r>
+              <a:rPr lang="en-US" sz="2400" dirty="0" err="1" smtClean="0"/>
+              <a:t>x_scale</a:t>
+            </a:r>
+            <a:r>
+              <a:rPr lang="en-US" sz="2400" dirty="0" smtClean="0"/>
+              <a:t>(</a:t>
+            </a:r>
+            <a:r>
+              <a:rPr lang="en-US" sz="2400" dirty="0" err="1"/>
+              <a:t>d.Age</a:t>
+            </a:r>
+            <a:r>
+              <a:rPr lang="en-US" sz="2400" dirty="0"/>
+              <a:t>);})</a:t>
+            </a:r>
+          </a:p>
+          <a:p>
+            <a:pPr marL="0" indent="0">
+              <a:buNone/>
+            </a:pPr>
+            <a:r>
+              <a:rPr lang="en-US" sz="2400" dirty="0"/>
+              <a:t>           .</a:t>
+            </a:r>
+            <a:r>
+              <a:rPr lang="en-US" sz="2400" dirty="0" err="1"/>
+              <a:t>attr</a:t>
+            </a:r>
+            <a:r>
+              <a:rPr lang="en-US" sz="2400" dirty="0"/>
+              <a:t>("transform", function(d) {return "translate(" + </a:t>
+            </a:r>
+            <a:r>
+              <a:rPr lang="en-US" sz="2400" dirty="0" smtClean="0"/>
+              <a:t>				</a:t>
+            </a:r>
+            <a:r>
+              <a:rPr lang="en-US" sz="2400" dirty="0" err="1" smtClean="0"/>
+              <a:t>x_scale</a:t>
+            </a:r>
+            <a:r>
+              <a:rPr lang="en-US" sz="2400" dirty="0" smtClean="0"/>
+              <a:t>(</a:t>
+            </a:r>
+            <a:r>
+              <a:rPr lang="en-US" sz="2400" dirty="0" err="1"/>
+              <a:t>d.Age</a:t>
+            </a:r>
+            <a:r>
+              <a:rPr lang="en-US" sz="2400" dirty="0"/>
+              <a:t>) + ",0)"; });</a:t>
+            </a:r>
+          </a:p>
+        </p:txBody>
+      </p:sp>
+      <p:sp>
+        <p:nvSpPr>
           <p:cNvPr id="2" name="Title 1"/>
           <p:cNvSpPr>
             <a:spLocks noGrp="1"/>
@@ -21956,183 +22658,6 @@
       </p:sp>
       <p:sp>
         <p:nvSpPr>
-          <p:cNvPr id="3" name="Content Placeholder 2"/>
-          <p:cNvSpPr>
-            <a:spLocks noGrp="1"/>
-          </p:cNvSpPr>
-          <p:nvPr>
-            <p:ph idx="1"/>
-          </p:nvPr>
-        </p:nvSpPr>
-        <p:spPr>
-          <a:xfrm>
-            <a:off x="1128943" y="1847153"/>
-            <a:ext cx="7887140" cy="4379976"/>
-          </a:xfrm>
-        </p:spPr>
-        <p:txBody>
-          <a:bodyPr/>
-          <a:lstStyle/>
-          <a:p>
-            <a:pPr marL="0" indent="0">
-              <a:buNone/>
-            </a:pPr>
-            <a:r>
-              <a:rPr lang="en-US" sz="2400" dirty="0"/>
-              <a:t> // The selection '.age' will correspond to the data</a:t>
-            </a:r>
-          </a:p>
-          <a:p>
-            <a:pPr marL="0" indent="0">
-              <a:buNone/>
-            </a:pPr>
-            <a:r>
-              <a:rPr lang="en-US" sz="2400" dirty="0" err="1" smtClean="0"/>
-              <a:t>var</a:t>
-            </a:r>
-            <a:r>
-              <a:rPr lang="en-US" sz="2400" dirty="0" smtClean="0"/>
-              <a:t> </a:t>
-            </a:r>
-            <a:r>
-              <a:rPr lang="en-US" sz="2400" dirty="0"/>
-              <a:t>age = </a:t>
-            </a:r>
-            <a:r>
-              <a:rPr lang="en-US" sz="2400" dirty="0" err="1"/>
-              <a:t>svg.selectAll</a:t>
-            </a:r>
-            <a:r>
-              <a:rPr lang="en-US" sz="2400" dirty="0"/>
-              <a:t>(".Age")</a:t>
-            </a:r>
-          </a:p>
-          <a:p>
-            <a:pPr marL="0" indent="0">
-              <a:buNone/>
-            </a:pPr>
-            <a:r>
-              <a:rPr lang="en-US" sz="2400" dirty="0" smtClean="0"/>
-              <a:t>		.</a:t>
-            </a:r>
-            <a:r>
-              <a:rPr lang="en-US" sz="2400" dirty="0"/>
-              <a:t>data(data)</a:t>
-            </a:r>
-          </a:p>
-          <a:p>
-            <a:pPr marL="0" indent="0">
-              <a:buNone/>
-            </a:pPr>
-            <a:r>
-              <a:rPr lang="en-US" sz="2400" dirty="0" smtClean="0"/>
-              <a:t>	.</a:t>
-            </a:r>
-            <a:r>
-              <a:rPr lang="en-US" sz="2400" dirty="0"/>
-              <a:t>enter().append("g"</a:t>
-            </a:r>
-            <a:r>
-              <a:rPr lang="en-US" sz="2400" dirty="0" smtClean="0"/>
-              <a:t>)  </a:t>
-            </a:r>
-            <a:endParaRPr lang="en-US" sz="2400" dirty="0"/>
-          </a:p>
-          <a:p>
-            <a:pPr marL="0" indent="0">
-              <a:buNone/>
-            </a:pPr>
-            <a:r>
-              <a:rPr lang="en-US" sz="2400" dirty="0"/>
-              <a:t>           .</a:t>
-            </a:r>
-            <a:r>
-              <a:rPr lang="en-US" sz="2400" dirty="0" err="1"/>
-              <a:t>attr</a:t>
-            </a:r>
-            <a:r>
-              <a:rPr lang="en-US" sz="2400" dirty="0"/>
-              <a:t>("class", "g")</a:t>
-            </a:r>
-          </a:p>
-          <a:p>
-            <a:pPr marL="0" indent="0">
-              <a:buNone/>
-            </a:pPr>
-            <a:r>
-              <a:rPr lang="en-US" sz="2400" dirty="0"/>
-              <a:t>           .</a:t>
-            </a:r>
-            <a:r>
-              <a:rPr lang="en-US" sz="2400" dirty="0" err="1"/>
-              <a:t>attr</a:t>
-            </a:r>
-            <a:r>
-              <a:rPr lang="en-US" sz="2400" dirty="0"/>
-              <a:t>("</a:t>
-            </a:r>
-            <a:r>
-              <a:rPr lang="en-US" sz="2400" dirty="0" err="1"/>
-              <a:t>x_position</a:t>
-            </a:r>
-            <a:r>
-              <a:rPr lang="en-US" sz="2400" dirty="0"/>
-              <a:t>", function (d) {</a:t>
-            </a:r>
-            <a:r>
-              <a:rPr lang="en-US" sz="2400" dirty="0" smtClean="0"/>
-              <a:t>return x</a:t>
-            </a:r>
-            <a:r>
-              <a:rPr lang="en-US" sz="2400" dirty="0"/>
-              <a:t>(</a:t>
-            </a:r>
-            <a:r>
-              <a:rPr lang="en-US" sz="2400" dirty="0" err="1"/>
-              <a:t>d.Age</a:t>
-            </a:r>
-            <a:r>
-              <a:rPr lang="en-US" sz="2400" dirty="0"/>
-              <a:t>);})</a:t>
-            </a:r>
-          </a:p>
-          <a:p>
-            <a:pPr marL="0" indent="0">
-              <a:buNone/>
-            </a:pPr>
-            <a:r>
-              <a:rPr lang="en-US" sz="2400" dirty="0"/>
-              <a:t>           .</a:t>
-            </a:r>
-            <a:r>
-              <a:rPr lang="en-US" sz="2400" dirty="0" err="1"/>
-              <a:t>attr</a:t>
-            </a:r>
-            <a:r>
-              <a:rPr lang="en-US" sz="2400" dirty="0"/>
-              <a:t>("transform", function(d) {return "translate(" + </a:t>
-            </a:r>
-            <a:r>
-              <a:rPr lang="en-US" sz="2400" dirty="0" smtClean="0"/>
-              <a:t>				x</a:t>
-            </a:r>
-            <a:r>
-              <a:rPr lang="en-US" sz="2400" dirty="0"/>
-              <a:t>(</a:t>
-            </a:r>
-            <a:r>
-              <a:rPr lang="en-US" sz="2400" dirty="0" err="1"/>
-              <a:t>d.Age</a:t>
-            </a:r>
-            <a:r>
-              <a:rPr lang="en-US" sz="2400" dirty="0"/>
-              <a:t>) + ",0)"; });</a:t>
-            </a:r>
-          </a:p>
-        </p:txBody>
-      </p:sp>
-      <p:sp>
-        <p:nvSpPr>
           <p:cNvPr id="4" name="Date Placeholder 3"/>
           <p:cNvSpPr>
             <a:spLocks noGrp="1"/>
@@ -22148,7 +22673,7 @@
           <a:p>
             <a:fld id="{7053BEFA-1175-F644-B249-7D41D72BD3FF}" type="datetime1">
               <a:rPr lang="en-US" smtClean="0"/>
-              <a:t>2/3/14</a:t>
+              <a:t>2/7/14</a:t>
             </a:fld>
             <a:endParaRPr lang="en-US"/>
           </a:p>
@@ -22204,8 +22729,8 @@
         </p:nvSpPr>
         <p:spPr>
           <a:xfrm>
-            <a:off x="1909037" y="4649127"/>
-            <a:ext cx="6796699" cy="986538"/>
+            <a:off x="1027825" y="4649127"/>
+            <a:ext cx="7988258" cy="986538"/>
           </a:xfrm>
           <a:prstGeom prst="rect">
             <a:avLst/>
@@ -22244,8 +22769,8 @@
         </p:nvSpPr>
         <p:spPr>
           <a:xfrm>
-            <a:off x="6264636" y="2432182"/>
-            <a:ext cx="2441101" cy="1478475"/>
+            <a:off x="5383424" y="2432182"/>
+            <a:ext cx="2869061" cy="1478475"/>
           </a:xfrm>
           <a:prstGeom prst="borderCallout1">
             <a:avLst>
@@ -22300,6 +22825,13 @@
   <p:clrMapOvr>
     <a:masterClrMapping/>
   </p:clrMapOvr>
+  <p:timing>
+    <p:tnLst>
+      <p:par>
+        <p:cTn xmlns:p14="http://schemas.microsoft.com/office/powerpoint/2010/main" id="1" dur="indefinite" restart="never" nodeType="tmRoot"/>
+      </p:par>
+    </p:tnLst>
+  </p:timing>
 </p:sld>
 </file>
 
@@ -22475,8 +23007,8 @@
               <a:t>("width", </a:t>
             </a:r>
             <a:r>
-              <a:rPr lang="en-US" sz="2400" dirty="0" err="1"/>
-              <a:t>x.rangeBand</a:t>
+              <a:rPr lang="en-US" sz="2400" dirty="0" err="1" smtClean="0"/>
+              <a:t>x_scale.rangeBand</a:t>
             </a:r>
             <a:r>
               <a:rPr lang="en-US" sz="2400" dirty="0"/>
@@ -22499,7 +23031,19 @@
             </a:r>
             <a:r>
               <a:rPr lang="en-US" sz="2400" dirty="0"/>
-              <a:t>("y", function(d) { return y(d.y1); }</a:t>
+              <a:t>("y", function(d) { return </a:t>
+            </a:r>
+            <a:r>
+              <a:rPr lang="en-US" sz="2400" dirty="0" err="1" smtClean="0"/>
+              <a:t>y_scale</a:t>
+            </a:r>
+            <a:r>
+              <a:rPr lang="en-US" sz="2400" dirty="0" smtClean="0"/>
+              <a:t>(</a:t>
+            </a:r>
+            <a:r>
+              <a:rPr lang="en-US" sz="2400" dirty="0"/>
+              <a:t>d.y1); }</a:t>
             </a:r>
             <a:r>
               <a:rPr lang="en-US" sz="2400" dirty="0" smtClean="0"/>
@@ -22518,30 +23062,65 @@
             </a:r>
             <a:r>
               <a:rPr lang="en-US" sz="2400" dirty="0"/>
-              <a:t>("height", function(d) { return y(d.y0) - y(d.y1); })</a:t>
-            </a:r>
-          </a:p>
-          <a:p>
-            <a:pPr marL="0" indent="0">
-              <a:buNone/>
-            </a:pPr>
+              <a:t>("height", function(d) { return </a:t>
+            </a:r>
+            <a:r>
+              <a:rPr lang="en-US" sz="2400" dirty="0" err="1" smtClean="0"/>
+              <a:t>y_scale</a:t>
+            </a:r>
             <a:r>
               <a:rPr lang="en-US" sz="2400" dirty="0" smtClean="0"/>
-              <a:t>		/</a:t>
-            </a:r>
-            <a:r>
-              <a:rPr lang="en-US" sz="2400" dirty="0"/>
-              <a:t>/ use the color scale to determine the fill </a:t>
+              <a:t>(</a:t>
+            </a:r>
+            <a:r>
+              <a:rPr lang="en-US" sz="2400" dirty="0"/>
+              <a:t>d.y0) </a:t>
             </a:r>
             <a:r>
               <a:rPr lang="en-US" sz="2400" dirty="0" smtClean="0"/>
-              <a:t>color</a:t>
+              <a:t>– </a:t>
             </a:r>
             <a:br>
               <a:rPr lang="en-US" sz="2400" dirty="0" smtClean="0"/>
             </a:br>
             <a:r>
               <a:rPr lang="en-US" sz="2400" dirty="0" smtClean="0"/>
+              <a:t>			</a:t>
+            </a:r>
+            <a:r>
+              <a:rPr lang="en-US" sz="2400" dirty="0" err="1" smtClean="0"/>
+              <a:t>y_scale</a:t>
+            </a:r>
+            <a:r>
+              <a:rPr lang="en-US" sz="2400" dirty="0" smtClean="0"/>
+              <a:t>(</a:t>
+            </a:r>
+            <a:r>
+              <a:rPr lang="en-US" sz="2400" dirty="0"/>
+              <a:t>d.y1); })</a:t>
+            </a:r>
+          </a:p>
+          <a:p>
+            <a:pPr marL="0" indent="0">
+              <a:buNone/>
+            </a:pPr>
+            <a:r>
+              <a:rPr lang="en-US" sz="2400" dirty="0" smtClean="0"/>
+              <a:t>		/</a:t>
+            </a:r>
+            <a:r>
+              <a:rPr lang="en-US" sz="2400" dirty="0"/>
+              <a:t>/ use the color scale to determine the fill </a:t>
+            </a:r>
+            <a:r>
+              <a:rPr lang="en-US" sz="2400" dirty="0" smtClean="0"/>
+              <a:t>color</a:t>
+            </a:r>
+            <a:br>
+              <a:rPr lang="en-US" sz="2400" dirty="0" smtClean="0"/>
+            </a:br>
+            <a:r>
+              <a:rPr lang="en-US" sz="2400" dirty="0" smtClean="0"/>
               <a:t>		.</a:t>
             </a:r>
             <a:r>
@@ -22573,7 +23152,6 @@
               <a:rPr lang="en-US" sz="2400" dirty="0"/>
               <a:t>	</a:t>
             </a:r>
-            <a:endParaRPr lang="en-US" sz="2400" dirty="0"/>
           </a:p>
         </p:txBody>
       </p:sp>
@@ -22594,7 +23172,7 @@
           <a:p>
             <a:fld id="{7053BEFA-1175-F644-B249-7D41D72BD3FF}" type="datetime1">
               <a:rPr lang="en-US" smtClean="0"/>
-              <a:t>2/3/14</a:t>
+              <a:t>2/7/14</a:t>
             </a:fld>
             <a:endParaRPr lang="en-US"/>
           </a:p>
@@ -22652,6 +23230,13 @@
   <p:clrMapOvr>
     <a:masterClrMapping/>
   </p:clrMapOvr>
+  <p:timing>
+    <p:tnLst>
+      <p:par>
+        <p:cTn xmlns:p14="http://schemas.microsoft.com/office/powerpoint/2010/main" id="1" dur="indefinite" restart="never" nodeType="tmRoot"/>
+      </p:par>
+    </p:tnLst>
+  </p:timing>
 </p:sld>
 </file>
 
@@ -22842,7 +23427,7 @@
               <a:rPr lang="en-US" sz="2400" dirty="0" smtClean="0"/>
             </a:br>
             <a:r>
-              <a:rPr lang="en-US" sz="2400" dirty="0" smtClean="0"/>
+              <a:rPr lang="en-US" sz="2400" dirty="0"/>
               <a:t>		.</a:t>
             </a:r>
             <a:r>
@@ -22851,11 +23436,70 @@
             </a:r>
             <a:r>
               <a:rPr lang="en-US" sz="2400" dirty="0"/>
-              <a:t>("y", function(d) { return y(d.y1); }</a:t>
-            </a:r>
+              <a:t>("y", function(d) { return </a:t>
+            </a:r>
+            <a:r>
+              <a:rPr lang="en-US" sz="2400" dirty="0" err="1"/>
+              <a:t>y_scale</a:t>
+            </a:r>
+            <a:r>
+              <a:rPr lang="en-US" sz="2400" dirty="0"/>
+              <a:t>(d.y1); })</a:t>
+            </a:r>
+            <a:br>
+              <a:rPr lang="en-US" sz="2400" dirty="0"/>
+            </a:br>
+            <a:r>
+              <a:rPr lang="en-US" sz="2400" dirty="0"/>
+              <a:t>		.</a:t>
+            </a:r>
+            <a:r>
+              <a:rPr lang="en-US" sz="2400" dirty="0" err="1"/>
+              <a:t>attr</a:t>
+            </a:r>
+            <a:r>
+              <a:rPr lang="en-US" sz="2400" dirty="0"/>
+              <a:t>("height", function(d) { return </a:t>
+            </a:r>
+            <a:r>
+              <a:rPr lang="en-US" sz="2400" dirty="0" err="1"/>
+              <a:t>y_scale</a:t>
+            </a:r>
+            <a:r>
+              <a:rPr lang="en-US" sz="2400" dirty="0"/>
+              <a:t>(d.y0) – </a:t>
+            </a:r>
+            <a:br>
+              <a:rPr lang="en-US" sz="2400" dirty="0"/>
+            </a:br>
+            <a:r>
+              <a:rPr lang="en-US" sz="2400" dirty="0"/>
+              <a:t>			</a:t>
+            </a:r>
+            <a:r>
+              <a:rPr lang="en-US" sz="2400" dirty="0" err="1"/>
+              <a:t>y_scale</a:t>
+            </a:r>
+            <a:r>
+              <a:rPr lang="en-US" sz="2400" dirty="0"/>
+              <a:t>(d.y1); })</a:t>
+            </a:r>
+          </a:p>
+          <a:p>
+            <a:pPr marL="0" indent="0">
+              <a:buNone/>
+            </a:pPr>
             <a:r>
               <a:rPr lang="en-US" sz="2400" dirty="0" smtClean="0"/>
-              <a:t>)</a:t>
+              <a:t>		/</a:t>
+            </a:r>
+            <a:r>
+              <a:rPr lang="en-US" sz="2400" dirty="0"/>
+              <a:t>/ use the color scale to determine the fill </a:t>
+            </a:r>
+            <a:r>
+              <a:rPr lang="en-US" sz="2400" dirty="0" smtClean="0"/>
+              <a:t>color</a:t>
             </a:r>
             <a:br>
               <a:rPr lang="en-US" sz="2400" dirty="0" smtClean="0"/>
@@ -22865,38 +23509,6 @@
               <a:t>		.</a:t>
             </a:r>
             <a:r>
-              <a:rPr lang="en-US" sz="2400" dirty="0" err="1"/>
-              <a:t>attr</a:t>
-            </a:r>
-            <a:r>
-              <a:rPr lang="en-US" sz="2400" dirty="0"/>
-              <a:t>("height", function(d) { return y(d.y0) - y(d.y1); })</a:t>
-            </a:r>
-          </a:p>
-          <a:p>
-            <a:pPr marL="0" indent="0">
-              <a:buNone/>
-            </a:pPr>
-            <a:r>
-              <a:rPr lang="en-US" sz="2400" dirty="0" smtClean="0"/>
-              <a:t>		/</a:t>
-            </a:r>
-            <a:r>
-              <a:rPr lang="en-US" sz="2400" dirty="0"/>
-              <a:t>/ use the color scale to determine the fill </a:t>
-            </a:r>
-            <a:r>
-              <a:rPr lang="en-US" sz="2400" dirty="0" smtClean="0"/>
-              <a:t>color</a:t>
-            </a:r>
-            <a:br>
-              <a:rPr lang="en-US" sz="2400" dirty="0" smtClean="0"/>
-            </a:br>
-            <a:r>
-              <a:rPr lang="en-US" sz="2400" dirty="0" smtClean="0"/>
-              <a:t>		.</a:t>
-            </a:r>
-            <a:r>
               <a:rPr lang="en-US" sz="2400" dirty="0" err="1" smtClean="0"/>
               <a:t>attr</a:t>
             </a:r>
@@ -22925,7 +23537,6 @@
               <a:rPr lang="en-US" sz="2400" dirty="0"/>
               <a:t>	</a:t>
             </a:r>
-            <a:endParaRPr lang="en-US" sz="2400" dirty="0"/>
           </a:p>
         </p:txBody>
       </p:sp>
@@ -22946,7 +23557,7 @@
           <a:p>
             <a:fld id="{7053BEFA-1175-F644-B249-7D41D72BD3FF}" type="datetime1">
               <a:rPr lang="en-US" smtClean="0"/>
-              <a:t>2/3/14</a:t>
+              <a:t>2/7/14</a:t>
             </a:fld>
             <a:endParaRPr lang="en-US"/>
           </a:p>
@@ -23102,6 +23713,13 @@
   <p:clrMapOvr>
     <a:masterClrMapping/>
   </p:clrMapOvr>
+  <p:timing>
+    <p:tnLst>
+      <p:par>
+        <p:cTn xmlns:p14="http://schemas.microsoft.com/office/powerpoint/2010/main" id="1" dur="indefinite" restart="never" nodeType="tmRoot"/>
+      </p:par>
+    </p:tnLst>
+  </p:timing>
 </p:sld>
 </file>
 
@@ -23292,7 +23910,7 @@
               <a:rPr lang="en-US" sz="2400" dirty="0" smtClean="0"/>
             </a:br>
             <a:r>
-              <a:rPr lang="en-US" sz="2400" dirty="0" smtClean="0"/>
+              <a:rPr lang="en-US" sz="2400" dirty="0"/>
               <a:t>		.</a:t>
             </a:r>
             <a:r>
@@ -23301,11 +23919,70 @@
             </a:r>
             <a:r>
               <a:rPr lang="en-US" sz="2400" dirty="0"/>
-              <a:t>("y", function(d) { return y(d.y1); }</a:t>
-            </a:r>
+              <a:t>("y", function(d) { return </a:t>
+            </a:r>
+            <a:r>
+              <a:rPr lang="en-US" sz="2400" dirty="0" err="1"/>
+              <a:t>y_scale</a:t>
+            </a:r>
+            <a:r>
+              <a:rPr lang="en-US" sz="2400" dirty="0"/>
+              <a:t>(d.y1); })</a:t>
+            </a:r>
+            <a:br>
+              <a:rPr lang="en-US" sz="2400" dirty="0"/>
+            </a:br>
+            <a:r>
+              <a:rPr lang="en-US" sz="2400" dirty="0"/>
+              <a:t>		.</a:t>
+            </a:r>
+            <a:r>
+              <a:rPr lang="en-US" sz="2400" dirty="0" err="1"/>
+              <a:t>attr</a:t>
+            </a:r>
+            <a:r>
+              <a:rPr lang="en-US" sz="2400" dirty="0"/>
+              <a:t>("height", function(d) { return </a:t>
+            </a:r>
+            <a:r>
+              <a:rPr lang="en-US" sz="2400" dirty="0" err="1"/>
+              <a:t>y_scale</a:t>
+            </a:r>
+            <a:r>
+              <a:rPr lang="en-US" sz="2400" dirty="0"/>
+              <a:t>(d.y0) – </a:t>
+            </a:r>
+            <a:br>
+              <a:rPr lang="en-US" sz="2400" dirty="0"/>
+            </a:br>
+            <a:r>
+              <a:rPr lang="en-US" sz="2400" dirty="0"/>
+              <a:t>			</a:t>
+            </a:r>
+            <a:r>
+              <a:rPr lang="en-US" sz="2400" dirty="0" err="1"/>
+              <a:t>y_scale</a:t>
+            </a:r>
+            <a:r>
+              <a:rPr lang="en-US" sz="2400" dirty="0"/>
+              <a:t>(d.y1); })</a:t>
+            </a:r>
+          </a:p>
+          <a:p>
+            <a:pPr marL="0" indent="0">
+              <a:buNone/>
+            </a:pPr>
             <a:r>
               <a:rPr lang="en-US" sz="2400" dirty="0" smtClean="0"/>
-              <a:t>)</a:t>
+              <a:t>		/</a:t>
+            </a:r>
+            <a:r>
+              <a:rPr lang="en-US" sz="2400" dirty="0"/>
+              <a:t>/ use the color scale to determine the fill </a:t>
+            </a:r>
+            <a:r>
+              <a:rPr lang="en-US" sz="2400" dirty="0" smtClean="0"/>
+              <a:t>color</a:t>
             </a:r>
             <a:br>
               <a:rPr lang="en-US" sz="2400" dirty="0" smtClean="0"/>
@@ -23315,38 +23992,6 @@
               <a:t>		.</a:t>
             </a:r>
             <a:r>
-              <a:rPr lang="en-US" sz="2400" dirty="0" err="1"/>
-              <a:t>attr</a:t>
-            </a:r>
-            <a:r>
-              <a:rPr lang="en-US" sz="2400" dirty="0"/>
-              <a:t>("height", function(d) { return y(d.y0) - y(d.y1); })</a:t>
-            </a:r>
-          </a:p>
-          <a:p>
-            <a:pPr marL="0" indent="0">
-              <a:buNone/>
-            </a:pPr>
-            <a:r>
-              <a:rPr lang="en-US" sz="2400" dirty="0" smtClean="0"/>
-              <a:t>		/</a:t>
-            </a:r>
-            <a:r>
-              <a:rPr lang="en-US" sz="2400" dirty="0"/>
-              <a:t>/ use the color scale to determine the fill </a:t>
-            </a:r>
-            <a:r>
-              <a:rPr lang="en-US" sz="2400" dirty="0" smtClean="0"/>
-              <a:t>color</a:t>
-            </a:r>
-            <a:br>
-              <a:rPr lang="en-US" sz="2400" dirty="0" smtClean="0"/>
-            </a:br>
-            <a:r>
-              <a:rPr lang="en-US" sz="2400" dirty="0" smtClean="0"/>
-              <a:t>		.</a:t>
-            </a:r>
-            <a:r>
               <a:rPr lang="en-US" sz="2400" dirty="0" err="1" smtClean="0"/>
               <a:t>attr</a:t>
             </a:r>
@@ -23375,7 +24020,6 @@
               <a:rPr lang="en-US" sz="2400" dirty="0"/>
               <a:t>	</a:t>
             </a:r>
-            <a:endParaRPr lang="en-US" sz="2400" dirty="0"/>
           </a:p>
         </p:txBody>
       </p:sp>
@@ -23396,7 +24040,7 @@
           <a:p>
             <a:fld id="{7053BEFA-1175-F644-B249-7D41D72BD3FF}" type="datetime1">
               <a:rPr lang="en-US" smtClean="0"/>
-              <a:t>2/3/14</a:t>
+              <a:t>2/7/14</a:t>
             </a:fld>
             <a:endParaRPr lang="en-US"/>
           </a:p>
@@ -23548,6 +24192,13 @@
   <p:clrMapOvr>
     <a:masterClrMapping/>
   </p:clrMapOvr>
+  <p:timing>
+    <p:tnLst>
+      <p:par>
+        <p:cTn xmlns:p14="http://schemas.microsoft.com/office/powerpoint/2010/main" id="1" dur="indefinite" restart="never" nodeType="tmRoot"/>
+      </p:par>
+    </p:tnLst>
+  </p:timing>
 </p:sld>
 </file>
 
@@ -23738,7 +24389,7 @@
               <a:rPr lang="en-US" sz="2400" dirty="0" smtClean="0"/>
             </a:br>
             <a:r>
-              <a:rPr lang="en-US" sz="2400" dirty="0" smtClean="0"/>
+              <a:rPr lang="en-US" sz="2400" dirty="0"/>
               <a:t>		.</a:t>
             </a:r>
             <a:r>
@@ -23747,11 +24398,70 @@
             </a:r>
             <a:r>
               <a:rPr lang="en-US" sz="2400" dirty="0"/>
-              <a:t>("y", function(d) { return y(d.y1); }</a:t>
-            </a:r>
+              <a:t>("y", function(d) { return </a:t>
+            </a:r>
+            <a:r>
+              <a:rPr lang="en-US" sz="2400" dirty="0" err="1"/>
+              <a:t>y_scale</a:t>
+            </a:r>
+            <a:r>
+              <a:rPr lang="en-US" sz="2400" dirty="0"/>
+              <a:t>(d.y1); })</a:t>
+            </a:r>
+            <a:br>
+              <a:rPr lang="en-US" sz="2400" dirty="0"/>
+            </a:br>
+            <a:r>
+              <a:rPr lang="en-US" sz="2400" dirty="0"/>
+              <a:t>		.</a:t>
+            </a:r>
+            <a:r>
+              <a:rPr lang="en-US" sz="2400" dirty="0" err="1"/>
+              <a:t>attr</a:t>
+            </a:r>
+            <a:r>
+              <a:rPr lang="en-US" sz="2400" dirty="0"/>
+              <a:t>("height", function(d) { return </a:t>
+            </a:r>
+            <a:r>
+              <a:rPr lang="en-US" sz="2400" dirty="0" err="1"/>
+              <a:t>y_scale</a:t>
+            </a:r>
+            <a:r>
+              <a:rPr lang="en-US" sz="2400" dirty="0"/>
+              <a:t>(d.y0) – </a:t>
+            </a:r>
+            <a:br>
+              <a:rPr lang="en-US" sz="2400" dirty="0"/>
+            </a:br>
+            <a:r>
+              <a:rPr lang="en-US" sz="2400" dirty="0"/>
+              <a:t>			</a:t>
+            </a:r>
+            <a:r>
+              <a:rPr lang="en-US" sz="2400" dirty="0" err="1"/>
+              <a:t>y_scale</a:t>
+            </a:r>
+            <a:r>
+              <a:rPr lang="en-US" sz="2400" dirty="0"/>
+              <a:t>(d.y1); })</a:t>
+            </a:r>
+          </a:p>
+          <a:p>
+            <a:pPr marL="0" indent="0">
+              <a:buNone/>
+            </a:pPr>
             <a:r>
               <a:rPr lang="en-US" sz="2400" dirty="0" smtClean="0"/>
-              <a:t>)</a:t>
+              <a:t>		/</a:t>
+            </a:r>
+            <a:r>
+              <a:rPr lang="en-US" sz="2400" dirty="0"/>
+              <a:t>/ use the color scale to determine the fill </a:t>
+            </a:r>
+            <a:r>
+              <a:rPr lang="en-US" sz="2400" dirty="0" smtClean="0"/>
+              <a:t>color</a:t>
             </a:r>
             <a:br>
               <a:rPr lang="en-US" sz="2400" dirty="0" smtClean="0"/>
@@ -23761,38 +24471,6 @@
               <a:t>		.</a:t>
             </a:r>
             <a:r>
-              <a:rPr lang="en-US" sz="2400" dirty="0" err="1"/>
-              <a:t>attr</a:t>
-            </a:r>
-            <a:r>
-              <a:rPr lang="en-US" sz="2400" dirty="0"/>
-              <a:t>("height", function(d) { return y(d.y0) - y(d.y1); })</a:t>
-            </a:r>
-          </a:p>
-          <a:p>
-            <a:pPr marL="0" indent="0">
-              <a:buNone/>
-            </a:pPr>
-            <a:r>
-              <a:rPr lang="en-US" sz="2400" dirty="0" smtClean="0"/>
-              <a:t>		/</a:t>
-            </a:r>
-            <a:r>
-              <a:rPr lang="en-US" sz="2400" dirty="0"/>
-              <a:t>/ use the color scale to determine the fill </a:t>
-            </a:r>
-            <a:r>
-              <a:rPr lang="en-US" sz="2400" dirty="0" smtClean="0"/>
-              <a:t>color</a:t>
-            </a:r>
-            <a:br>
-              <a:rPr lang="en-US" sz="2400" dirty="0" smtClean="0"/>
-            </a:br>
-            <a:r>
-              <a:rPr lang="en-US" sz="2400" dirty="0" smtClean="0"/>
-              <a:t>		.</a:t>
-            </a:r>
-            <a:r>
               <a:rPr lang="en-US" sz="2400" dirty="0" err="1" smtClean="0"/>
               <a:t>attr</a:t>
             </a:r>
@@ -23821,7 +24499,6 @@
               <a:rPr lang="en-US" sz="2400" dirty="0"/>
               <a:t>	</a:t>
             </a:r>
-            <a:endParaRPr lang="en-US" sz="2400" dirty="0"/>
           </a:p>
         </p:txBody>
       </p:sp>
@@ -23842,7 +24519,7 @@
           <a:p>
             <a:fld id="{7053BEFA-1175-F644-B249-7D41D72BD3FF}" type="datetime1">
               <a:rPr lang="en-US" smtClean="0"/>
-              <a:t>2/3/14</a:t>
+              <a:t>2/7/14</a:t>
             </a:fld>
             <a:endParaRPr lang="en-US"/>
           </a:p>
@@ -23994,6 +24671,13 @@
   <p:clrMapOvr>
     <a:masterClrMapping/>
   </p:clrMapOvr>
+  <p:timing>
+    <p:tnLst>
+      <p:par>
+        <p:cTn xmlns:p14="http://schemas.microsoft.com/office/powerpoint/2010/main" id="1" dur="indefinite" restart="never" nodeType="tmRoot"/>
+      </p:par>
+    </p:tnLst>
+  </p:timing>
 </p:sld>
 </file>
 
@@ -24185,7 +24869,11 @@
             </a:br>
             <a:r>
               <a:rPr lang="en-US" sz="2400" dirty="0" smtClean="0"/>
-              <a:t>		.</a:t>
+              <a:t>		</a:t>
+            </a:r>
+            <a:r>
+              <a:rPr lang="en-US" sz="2400" dirty="0" smtClean="0"/>
+              <a:t>.</a:t>
             </a:r>
             <a:r>
               <a:rPr lang="en-US" sz="2400" dirty="0" err="1"/>
@@ -24193,11 +24881,70 @@
             </a:r>
             <a:r>
               <a:rPr lang="en-US" sz="2400" dirty="0"/>
-              <a:t>("y", function(d) { return y(d.y1); }</a:t>
-            </a:r>
+              <a:t>("y", function(d) { return </a:t>
+            </a:r>
+            <a:r>
+              <a:rPr lang="en-US" sz="2400" dirty="0" err="1"/>
+              <a:t>y_scale</a:t>
+            </a:r>
+            <a:r>
+              <a:rPr lang="en-US" sz="2400" dirty="0"/>
+              <a:t>(d.y1); })</a:t>
+            </a:r>
+            <a:br>
+              <a:rPr lang="en-US" sz="2400" dirty="0"/>
+            </a:br>
+            <a:r>
+              <a:rPr lang="en-US" sz="2400" dirty="0"/>
+              <a:t>		.</a:t>
+            </a:r>
+            <a:r>
+              <a:rPr lang="en-US" sz="2400" dirty="0" err="1"/>
+              <a:t>attr</a:t>
+            </a:r>
+            <a:r>
+              <a:rPr lang="en-US" sz="2400" dirty="0"/>
+              <a:t>("height", function(d) { return </a:t>
+            </a:r>
+            <a:r>
+              <a:rPr lang="en-US" sz="2400" dirty="0" err="1"/>
+              <a:t>y_scale</a:t>
+            </a:r>
+            <a:r>
+              <a:rPr lang="en-US" sz="2400" dirty="0"/>
+              <a:t>(d.y0) – </a:t>
+            </a:r>
+            <a:br>
+              <a:rPr lang="en-US" sz="2400" dirty="0"/>
+            </a:br>
+            <a:r>
+              <a:rPr lang="en-US" sz="2400" dirty="0"/>
+              <a:t>			</a:t>
+            </a:r>
+            <a:r>
+              <a:rPr lang="en-US" sz="2400" dirty="0" err="1"/>
+              <a:t>y_scale</a:t>
+            </a:r>
+            <a:r>
+              <a:rPr lang="en-US" sz="2400" dirty="0"/>
+              <a:t>(d.y1); })</a:t>
+            </a:r>
+          </a:p>
+          <a:p>
+            <a:pPr marL="0" indent="0">
+              <a:buNone/>
+            </a:pPr>
             <a:r>
               <a:rPr lang="en-US" sz="2400" dirty="0" smtClean="0"/>
-              <a:t>)</a:t>
+              <a:t>		/</a:t>
+            </a:r>
+            <a:r>
+              <a:rPr lang="en-US" sz="2400" dirty="0"/>
+              <a:t>/ use the color scale to determine the fill </a:t>
+            </a:r>
+            <a:r>
+              <a:rPr lang="en-US" sz="2400" dirty="0" smtClean="0"/>
+              <a:t>color</a:t>
             </a:r>
             <a:br>
               <a:rPr lang="en-US" sz="2400" dirty="0" smtClean="0"/>
@@ -24207,38 +24954,6 @@
               <a:t>		.</a:t>
             </a:r>
             <a:r>
-              <a:rPr lang="en-US" sz="2400" dirty="0" err="1"/>
-              <a:t>attr</a:t>
-            </a:r>
-            <a:r>
-              <a:rPr lang="en-US" sz="2400" dirty="0"/>
-              <a:t>("height", function(d) { return y(d.y0) - y(d.y1); })</a:t>
-            </a:r>
-          </a:p>
-          <a:p>
-            <a:pPr marL="0" indent="0">
-              <a:buNone/>
-            </a:pPr>
-            <a:r>
-              <a:rPr lang="en-US" sz="2400" dirty="0" smtClean="0"/>
-              <a:t>		/</a:t>
-            </a:r>
-            <a:r>
-              <a:rPr lang="en-US" sz="2400" dirty="0"/>
-              <a:t>/ use the color scale to determine the fill </a:t>
-            </a:r>
-            <a:r>
-              <a:rPr lang="en-US" sz="2400" dirty="0" smtClean="0"/>
-              <a:t>color</a:t>
-            </a:r>
-            <a:br>
-              <a:rPr lang="en-US" sz="2400" dirty="0" smtClean="0"/>
-            </a:br>
-            <a:r>
-              <a:rPr lang="en-US" sz="2400" dirty="0" smtClean="0"/>
-              <a:t>		.</a:t>
-            </a:r>
-            <a:r>
               <a:rPr lang="en-US" sz="2400" dirty="0" err="1" smtClean="0"/>
               <a:t>attr</a:t>
             </a:r>
@@ -24267,7 +24982,6 @@
               <a:rPr lang="en-US" sz="2400" dirty="0"/>
               <a:t>	</a:t>
             </a:r>
-            <a:endParaRPr lang="en-US" sz="2400" dirty="0"/>
           </a:p>
         </p:txBody>
       </p:sp>
@@ -24288,7 +25002,7 @@
           <a:p>
             <a:fld id="{7053BEFA-1175-F644-B249-7D41D72BD3FF}" type="datetime1">
               <a:rPr lang="en-US" smtClean="0"/>
-              <a:t>2/3/14</a:t>
+              <a:t>2/7/14</a:t>
             </a:fld>
             <a:endParaRPr lang="en-US"/>
           </a:p>
@@ -24344,8 +25058,8 @@
         </p:nvSpPr>
         <p:spPr>
           <a:xfrm>
-            <a:off x="1768708" y="4652100"/>
-            <a:ext cx="7375292" cy="398212"/>
+            <a:off x="1768708" y="4652099"/>
+            <a:ext cx="7375292" cy="764327"/>
           </a:xfrm>
           <a:prstGeom prst="rect">
             <a:avLst/>
@@ -24440,6 +25154,13 @@
   <p:clrMapOvr>
     <a:masterClrMapping/>
   </p:clrMapOvr>
+  <p:timing>
+    <p:tnLst>
+      <p:par>
+        <p:cTn xmlns:p14="http://schemas.microsoft.com/office/powerpoint/2010/main" id="1" dur="indefinite" restart="never" nodeType="tmRoot"/>
+      </p:par>
+    </p:tnLst>
+  </p:timing>
 </p:sld>
 </file>
 
@@ -24631,7 +25352,11 @@
             </a:br>
             <a:r>
               <a:rPr lang="en-US" sz="2400" dirty="0" smtClean="0"/>
-              <a:t>		.</a:t>
+              <a:t>		</a:t>
+            </a:r>
+            <a:r>
+              <a:rPr lang="en-US" sz="2400" dirty="0" smtClean="0"/>
+              <a:t>.</a:t>
             </a:r>
             <a:r>
               <a:rPr lang="en-US" sz="2400" dirty="0" err="1"/>
@@ -24639,11 +25364,70 @@
             </a:r>
             <a:r>
               <a:rPr lang="en-US" sz="2400" dirty="0"/>
-              <a:t>("y", function(d) { return y(d.y1); }</a:t>
-            </a:r>
+              <a:t>("y", function(d) { return </a:t>
+            </a:r>
+            <a:r>
+              <a:rPr lang="en-US" sz="2400" dirty="0" err="1"/>
+              <a:t>y_scale</a:t>
+            </a:r>
+            <a:r>
+              <a:rPr lang="en-US" sz="2400" dirty="0"/>
+              <a:t>(d.y1); })</a:t>
+            </a:r>
+            <a:br>
+              <a:rPr lang="en-US" sz="2400" dirty="0"/>
+            </a:br>
+            <a:r>
+              <a:rPr lang="en-US" sz="2400" dirty="0"/>
+              <a:t>		.</a:t>
+            </a:r>
+            <a:r>
+              <a:rPr lang="en-US" sz="2400" dirty="0" err="1"/>
+              <a:t>attr</a:t>
+            </a:r>
+            <a:r>
+              <a:rPr lang="en-US" sz="2400" dirty="0"/>
+              <a:t>("height", function(d) { return </a:t>
+            </a:r>
+            <a:r>
+              <a:rPr lang="en-US" sz="2400" dirty="0" err="1"/>
+              <a:t>y_scale</a:t>
+            </a:r>
+            <a:r>
+              <a:rPr lang="en-US" sz="2400" dirty="0"/>
+              <a:t>(d.y0) – </a:t>
+            </a:r>
+            <a:br>
+              <a:rPr lang="en-US" sz="2400" dirty="0"/>
+            </a:br>
+            <a:r>
+              <a:rPr lang="en-US" sz="2400" dirty="0"/>
+              <a:t>			</a:t>
+            </a:r>
+            <a:r>
+              <a:rPr lang="en-US" sz="2400" dirty="0" err="1"/>
+              <a:t>y_scale</a:t>
+            </a:r>
+            <a:r>
+              <a:rPr lang="en-US" sz="2400" dirty="0"/>
+              <a:t>(d.y1); })</a:t>
+            </a:r>
+          </a:p>
+          <a:p>
+            <a:pPr marL="0" indent="0">
+              <a:buNone/>
+            </a:pPr>
             <a:r>
               <a:rPr lang="en-US" sz="2400" dirty="0" smtClean="0"/>
-              <a:t>)</a:t>
+              <a:t>		/</a:t>
+            </a:r>
+            <a:r>
+              <a:rPr lang="en-US" sz="2400" dirty="0"/>
+              <a:t>/ use the color scale to determine the fill </a:t>
+            </a:r>
+            <a:r>
+              <a:rPr lang="en-US" sz="2400" dirty="0" smtClean="0"/>
+              <a:t>color</a:t>
             </a:r>
             <a:br>
               <a:rPr lang="en-US" sz="2400" dirty="0" smtClean="0"/>
@@ -24653,38 +25437,6 @@
               <a:t>		.</a:t>
             </a:r>
             <a:r>
-              <a:rPr lang="en-US" sz="2400" dirty="0" err="1"/>
-              <a:t>attr</a:t>
-            </a:r>
-            <a:r>
-              <a:rPr lang="en-US" sz="2400" dirty="0"/>
-              <a:t>("height", function(d) { return y(d.y0) - y(d.y1); })</a:t>
-            </a:r>
-          </a:p>
-          <a:p>
-            <a:pPr marL="0" indent="0">
-              <a:buNone/>
-            </a:pPr>
-            <a:r>
-              <a:rPr lang="en-US" sz="2400" dirty="0" smtClean="0"/>
-              <a:t>		/</a:t>
-            </a:r>
-            <a:r>
-              <a:rPr lang="en-US" sz="2400" dirty="0"/>
-              <a:t>/ use the color scale to determine the fill </a:t>
-            </a:r>
-            <a:r>
-              <a:rPr lang="en-US" sz="2400" dirty="0" smtClean="0"/>
-              <a:t>color</a:t>
-            </a:r>
-            <a:br>
-              <a:rPr lang="en-US" sz="2400" dirty="0" smtClean="0"/>
-            </a:br>
-            <a:r>
-              <a:rPr lang="en-US" sz="2400" dirty="0" smtClean="0"/>
-              <a:t>		.</a:t>
-            </a:r>
-            <a:r>
               <a:rPr lang="en-US" sz="2400" dirty="0" err="1" smtClean="0"/>
               <a:t>attr</a:t>
             </a:r>
@@ -24713,7 +25465,6 @@
               <a:rPr lang="en-US" sz="2400" dirty="0"/>
               <a:t>	</a:t>
             </a:r>
-            <a:endParaRPr lang="en-US" sz="2400" dirty="0"/>
           </a:p>
         </p:txBody>
       </p:sp>
@@ -24734,7 +25485,7 @@
           <a:p>
             <a:fld id="{7053BEFA-1175-F644-B249-7D41D72BD3FF}" type="datetime1">
               <a:rPr lang="en-US" smtClean="0"/>
-              <a:t>2/3/14</a:t>
+              <a:t>2/7/14</a:t>
             </a:fld>
             <a:endParaRPr lang="en-US"/>
           </a:p>
@@ -24790,7 +25541,7 @@
         </p:nvSpPr>
         <p:spPr>
           <a:xfrm>
-            <a:off x="1768708" y="5075600"/>
+            <a:off x="1768708" y="5360675"/>
             <a:ext cx="7375292" cy="1074325"/>
           </a:xfrm>
           <a:prstGeom prst="rect">
@@ -24830,7 +25581,7 @@
         </p:nvSpPr>
         <p:spPr>
           <a:xfrm>
-            <a:off x="5736646" y="3787634"/>
+            <a:off x="6060614" y="4318910"/>
             <a:ext cx="2441101" cy="657733"/>
           </a:xfrm>
           <a:prstGeom prst="borderCallout1">
@@ -24886,6 +25637,13 @@
   <p:clrMapOvr>
     <a:masterClrMapping/>
   </p:clrMapOvr>
+  <p:timing>
+    <p:tnLst>
+      <p:par>
+        <p:cTn xmlns:p14="http://schemas.microsoft.com/office/powerpoint/2010/main" id="1" dur="indefinite" restart="never" nodeType="tmRoot"/>
+      </p:par>
+    </p:tnLst>
+  </p:timing>
 </p:sld>
 </file>
 
@@ -24946,7 +25704,7 @@
           <a:p>
             <a:fld id="{7053BEFA-1175-F644-B249-7D41D72BD3FF}" type="datetime1">
               <a:rPr lang="en-US" smtClean="0"/>
-              <a:t>2/3/14</a:t>
+              <a:t>2/7/14</a:t>
             </a:fld>
             <a:endParaRPr lang="en-US"/>
           </a:p>
@@ -25068,6 +25826,13 @@
   <p:clrMapOvr>
     <a:masterClrMapping/>
   </p:clrMapOvr>
+  <p:timing>
+    <p:tnLst>
+      <p:par>
+        <p:cTn xmlns:p14="http://schemas.microsoft.com/office/powerpoint/2010/main" id="1" dur="indefinite" restart="never" nodeType="tmRoot"/>
+      </p:par>
+    </p:tnLst>
+  </p:timing>
 </p:sld>
 </file>
 
@@ -25172,16 +25937,22 @@
             </a:pPr>
             <a:r>
               <a:rPr lang="en-US" sz="1800" dirty="0"/>
-              <a:t>&lt;!DOCTYPE html&gt;</a:t>
-            </a:r>
-          </a:p>
-          <a:p>
-            <a:pPr marL="228600" lvl="1" indent="0">
-              <a:buNone/>
-            </a:pPr>
+              <a:t>&lt;!DOCTYPE html</a:t>
+            </a:r>
+            <a:r>
+              <a:rPr lang="en-US" sz="1800" dirty="0" smtClean="0"/>
+              <a:t>&gt;</a:t>
+            </a:r>
+            <a:br>
+              <a:rPr lang="en-US" sz="1800" dirty="0" smtClean="0"/>
+            </a:br>
+            <a:r>
+              <a:rPr lang="en-US" sz="1800" dirty="0" smtClean="0"/>
+              <a:t>&lt;</a:t>
+            </a:r>
             <a:r>
               <a:rPr lang="en-US" sz="1800" dirty="0"/>
-              <a:t>&lt;meta charset="utf-</a:t>
+              <a:t>meta charset="utf-</a:t>
             </a:r>
             <a:r>
               <a:rPr lang="en-US" sz="1800" dirty="0" smtClean="0"/>
@@ -25194,16 +25965,22 @@
             </a:pPr>
             <a:r>
               <a:rPr lang="en-US" sz="1800" b="1" dirty="0"/>
-              <a:t>&lt;style&gt;</a:t>
-            </a:r>
-          </a:p>
-          <a:p>
-            <a:pPr marL="228600" lvl="1" indent="0">
-              <a:buNone/>
-            </a:pPr>
+              <a:t>&lt;style</a:t>
+            </a:r>
+            <a:r>
+              <a:rPr lang="en-US" sz="1800" b="1" dirty="0" smtClean="0"/>
+              <a:t>&gt;</a:t>
+            </a:r>
+            <a:br>
+              <a:rPr lang="en-US" sz="1800" b="1" dirty="0" smtClean="0"/>
+            </a:br>
+            <a:r>
+              <a:rPr lang="en-US" sz="1800" b="1" dirty="0" smtClean="0"/>
+              <a:t>body </a:t>
+            </a:r>
             <a:r>
               <a:rPr lang="en-US" sz="1800" b="1" dirty="0"/>
-              <a:t>body { </a:t>
+              <a:t>{ </a:t>
             </a:r>
             <a:r>
               <a:rPr lang="en-US" sz="1800" b="1" dirty="0">
@@ -25227,16 +26004,22 @@
             </a:r>
             <a:r>
               <a:rPr lang="en-US" sz="1800" b="1" dirty="0"/>
-              <a:t>; }</a:t>
-            </a:r>
-          </a:p>
-          <a:p>
-            <a:pPr marL="228600" lvl="1" indent="0">
-              <a:buNone/>
-            </a:pPr>
+              <a:t>; </a:t>
+            </a:r>
+            <a:r>
+              <a:rPr lang="en-US" sz="1800" b="1" dirty="0" smtClean="0"/>
+              <a:t>}</a:t>
+            </a:r>
+            <a:br>
+              <a:rPr lang="en-US" sz="1800" b="1" dirty="0" smtClean="0"/>
+            </a:br>
+            <a:r>
+              <a:rPr lang="en-US" sz="1800" b="1" dirty="0" smtClean="0"/>
+              <a:t>&lt;</a:t>
+            </a:r>
             <a:r>
               <a:rPr lang="en-US" sz="1800" b="1" dirty="0"/>
-              <a:t>&lt;/style&gt;</a:t>
+              <a:t>/style&gt;</a:t>
             </a:r>
             <a:endParaRPr lang="en-US" sz="1800" b="1" dirty="0" smtClean="0"/>
           </a:p>
@@ -25259,7 +26042,7 @@
           <a:p>
             <a:fld id="{7053BEFA-1175-F644-B249-7D41D72BD3FF}" type="datetime1">
               <a:rPr lang="en-US" smtClean="0"/>
-              <a:t>2/3/14</a:t>
+              <a:t>2/7/14</a:t>
             </a:fld>
             <a:endParaRPr lang="en-US"/>
           </a:p>
@@ -25384,7 +26167,7 @@
           <a:p>
             <a:fld id="{7053BEFA-1175-F644-B249-7D41D72BD3FF}" type="datetime1">
               <a:rPr lang="en-US" smtClean="0"/>
-              <a:t>2/3/14</a:t>
+              <a:t>2/7/14</a:t>
             </a:fld>
             <a:endParaRPr lang="en-US"/>
           </a:p>
@@ -25506,6 +26289,13 @@
   <p:clrMapOvr>
     <a:masterClrMapping/>
   </p:clrMapOvr>
+  <p:timing>
+    <p:tnLst>
+      <p:par>
+        <p:cTn xmlns:p14="http://schemas.microsoft.com/office/powerpoint/2010/main" id="1" dur="indefinite" restart="never" nodeType="tmRoot"/>
+      </p:par>
+    </p:tnLst>
+  </p:timing>
 </p:sld>
 </file>
 
@@ -25732,7 +26522,7 @@
           <a:p>
             <a:fld id="{7053BEFA-1175-F644-B249-7D41D72BD3FF}" type="datetime1">
               <a:rPr lang="en-US" smtClean="0"/>
-              <a:t>2/3/14</a:t>
+              <a:t>2/7/14</a:t>
             </a:fld>
             <a:endParaRPr lang="en-US"/>
           </a:p>
@@ -26267,7 +27057,7 @@
           <a:p>
             <a:fld id="{7053BEFA-1175-F644-B249-7D41D72BD3FF}" type="datetime1">
               <a:rPr lang="en-US" smtClean="0"/>
-              <a:t>2/3/14</a:t>
+              <a:t>2/7/14</a:t>
             </a:fld>
             <a:endParaRPr lang="en-US"/>
           </a:p>
@@ -26489,7 +27279,7 @@
           <a:p>
             <a:fld id="{7053BEFA-1175-F644-B249-7D41D72BD3FF}" type="datetime1">
               <a:rPr lang="en-US" smtClean="0"/>
-              <a:t>2/3/14</a:t>
+              <a:t>2/7/14</a:t>
             </a:fld>
             <a:endParaRPr lang="en-US"/>
           </a:p>
@@ -26617,16 +27407,22 @@
             </a:pPr>
             <a:r>
               <a:rPr lang="en-US" dirty="0"/>
-              <a:t>&lt;!DOCTYPE html&gt;</a:t>
-            </a:r>
-          </a:p>
-          <a:p>
-            <a:pPr marL="0" indent="0">
-              <a:buNone/>
-            </a:pPr>
+              <a:t>&lt;!DOCTYPE html</a:t>
+            </a:r>
+            <a:r>
+              <a:rPr lang="en-US" dirty="0" smtClean="0"/>
+              <a:t>&gt;</a:t>
+            </a:r>
+            <a:br>
+              <a:rPr lang="en-US" dirty="0" smtClean="0"/>
+            </a:br>
+            <a:r>
+              <a:rPr lang="en-US" dirty="0" smtClean="0"/>
+              <a:t>&lt;</a:t>
+            </a:r>
             <a:r>
               <a:rPr lang="en-US" dirty="0"/>
-              <a:t>&lt;meta </a:t>
+              <a:t>meta </a:t>
             </a:r>
             <a:r>
               <a:rPr lang="en-US" dirty="0">
@@ -26646,20 +27442,30 @@
                   <a:srgbClr val="618091"/>
                 </a:solidFill>
               </a:rPr>
-              <a:t>utf-8</a:t>
+              <a:t>utf-</a:t>
+            </a:r>
+            <a:r>
+              <a:rPr lang="en-US" dirty="0" smtClean="0">
+                <a:solidFill>
+                  <a:srgbClr val="618091"/>
+                </a:solidFill>
+              </a:rPr>
+              <a:t>8</a:t>
+            </a:r>
+            <a:r>
+              <a:rPr lang="en-US" dirty="0" smtClean="0"/>
+              <a:t>”&gt;</a:t>
+            </a:r>
+            <a:br>
+              <a:rPr lang="en-US" dirty="0" smtClean="0"/>
+            </a:br>
+            <a:r>
+              <a:rPr lang="en-US" dirty="0" smtClean="0"/>
+              <a:t>&lt;</a:t>
             </a:r>
             <a:r>
               <a:rPr lang="en-US" dirty="0"/>
-              <a:t>"&gt;</a:t>
-            </a:r>
-          </a:p>
-          <a:p>
-            <a:pPr marL="0" indent="0">
-              <a:buNone/>
-            </a:pPr>
-            <a:r>
-              <a:rPr lang="en-US" dirty="0"/>
-              <a:t>&lt;style&gt;</a:t>
+              <a:t>style&gt;</a:t>
             </a:r>
             <a:r>
               <a:rPr lang="en-US" dirty="0">
@@ -26680,16 +27486,22 @@
             </a:pPr>
             <a:r>
               <a:rPr lang="en-US" dirty="0"/>
-              <a:t>&lt;body&gt;</a:t>
-            </a:r>
-          </a:p>
-          <a:p>
-            <a:pPr marL="0" indent="0">
-              <a:buNone/>
-            </a:pPr>
+              <a:t>&lt;body</a:t>
+            </a:r>
+            <a:r>
+              <a:rPr lang="en-US" dirty="0" smtClean="0"/>
+              <a:t>&gt;</a:t>
+            </a:r>
+            <a:br>
+              <a:rPr lang="en-US" dirty="0" smtClean="0"/>
+            </a:br>
+            <a:r>
+              <a:rPr lang="en-US" dirty="0" smtClean="0"/>
+              <a:t>&lt;</a:t>
+            </a:r>
             <a:r>
               <a:rPr lang="en-US" dirty="0"/>
-              <a:t>&lt;script </a:t>
+              <a:t>script </a:t>
             </a:r>
             <a:r>
               <a:rPr lang="en-US" dirty="0" err="1">
@@ -26713,16 +27525,22 @@
             </a:r>
             <a:r>
               <a:rPr lang="en-US" dirty="0"/>
-              <a:t>"&gt;&lt;/script&gt;</a:t>
-            </a:r>
-          </a:p>
-          <a:p>
-            <a:pPr marL="0" indent="0">
-              <a:buNone/>
-            </a:pPr>
+              <a:t>"&gt;&lt;/script</a:t>
+            </a:r>
+            <a:r>
+              <a:rPr lang="en-US" dirty="0" smtClean="0"/>
+              <a:t>&gt;</a:t>
+            </a:r>
+            <a:br>
+              <a:rPr lang="en-US" dirty="0" smtClean="0"/>
+            </a:br>
+            <a:r>
+              <a:rPr lang="en-US" dirty="0" smtClean="0"/>
+              <a:t>&lt;</a:t>
+            </a:r>
             <a:r>
               <a:rPr lang="en-US" dirty="0"/>
-              <a:t>&lt;script&gt;</a:t>
+              <a:t>script&gt;</a:t>
             </a:r>
             <a:r>
               <a:rPr lang="en-US" dirty="0">
@@ -26734,8 +27552,22 @@
             </a:r>
             <a:r>
               <a:rPr lang="en-US" dirty="0"/>
-              <a:t>&lt;/script&gt;</a:t>
-            </a:r>
+              <a:t>&lt;/script</a:t>
+            </a:r>
+            <a:r>
+              <a:rPr lang="en-US" dirty="0" smtClean="0"/>
+              <a:t>&gt;</a:t>
+            </a:r>
+          </a:p>
+          <a:p>
+            <a:pPr marL="0" indent="0">
+              <a:buNone/>
+            </a:pPr>
+            <a:r>
+              <a:rPr lang="en-US" dirty="0" smtClean="0"/>
+              <a:t>&lt;/body&gt;</a:t>
+            </a:r>
+            <a:endParaRPr lang="en-US" dirty="0"/>
           </a:p>
         </p:txBody>
       </p:sp>
@@ -26756,7 +27588,7 @@
           <a:p>
             <a:fld id="{7053BEFA-1175-F644-B249-7D41D72BD3FF}" type="datetime1">
               <a:rPr lang="en-US" smtClean="0"/>
-              <a:t>2/3/14</a:t>
+              <a:t>2/7/14</a:t>
             </a:fld>
             <a:endParaRPr lang="en-US"/>
           </a:p>

</xml_diff>